<commit_message>
Regenerate ARI_Algo figs and edit Arch fig
</commit_message>
<xml_diff>
--- a/Figures/Arcs/Architecture.pptx
+++ b/Figures/Arcs/Architecture.pptx
@@ -197,7 +197,7 @@
           <a:p>
             <a:fld id="{4F2B3EEC-C8B4-0543-943F-91B3791C5E43}" type="datetimeFigureOut">
               <a:rPr lang="en-US" smtClean="0"/>
-              <a:t>10/17/23</a:t>
+              <a:t>10/19/23</a:t>
             </a:fld>
             <a:endParaRPr lang="en-US"/>
           </a:p>
@@ -734,7 +734,7 @@
           <a:p>
             <a:fld id="{697CBF4A-2AD2-1249-BC5E-D6BCA9656194}" type="datetimeFigureOut">
               <a:rPr lang="en-US" smtClean="0"/>
-              <a:t>10/17/23</a:t>
+              <a:t>10/19/23</a:t>
             </a:fld>
             <a:endParaRPr lang="en-US"/>
           </a:p>
@@ -932,7 +932,7 @@
           <a:p>
             <a:fld id="{697CBF4A-2AD2-1249-BC5E-D6BCA9656194}" type="datetimeFigureOut">
               <a:rPr lang="en-US" smtClean="0"/>
-              <a:t>10/17/23</a:t>
+              <a:t>10/19/23</a:t>
             </a:fld>
             <a:endParaRPr lang="en-US"/>
           </a:p>
@@ -1140,7 +1140,7 @@
           <a:p>
             <a:fld id="{697CBF4A-2AD2-1249-BC5E-D6BCA9656194}" type="datetimeFigureOut">
               <a:rPr lang="en-US" smtClean="0"/>
-              <a:t>10/17/23</a:t>
+              <a:t>10/19/23</a:t>
             </a:fld>
             <a:endParaRPr lang="en-US"/>
           </a:p>
@@ -1338,7 +1338,7 @@
           <a:p>
             <a:fld id="{697CBF4A-2AD2-1249-BC5E-D6BCA9656194}" type="datetimeFigureOut">
               <a:rPr lang="en-US" smtClean="0"/>
-              <a:t>10/17/23</a:t>
+              <a:t>10/19/23</a:t>
             </a:fld>
             <a:endParaRPr lang="en-US"/>
           </a:p>
@@ -1613,7 +1613,7 @@
           <a:p>
             <a:fld id="{697CBF4A-2AD2-1249-BC5E-D6BCA9656194}" type="datetimeFigureOut">
               <a:rPr lang="en-US" smtClean="0"/>
-              <a:t>10/17/23</a:t>
+              <a:t>10/19/23</a:t>
             </a:fld>
             <a:endParaRPr lang="en-US"/>
           </a:p>
@@ -1878,7 +1878,7 @@
           <a:p>
             <a:fld id="{697CBF4A-2AD2-1249-BC5E-D6BCA9656194}" type="datetimeFigureOut">
               <a:rPr lang="en-US" smtClean="0"/>
-              <a:t>10/17/23</a:t>
+              <a:t>10/19/23</a:t>
             </a:fld>
             <a:endParaRPr lang="en-US"/>
           </a:p>
@@ -2290,7 +2290,7 @@
           <a:p>
             <a:fld id="{697CBF4A-2AD2-1249-BC5E-D6BCA9656194}" type="datetimeFigureOut">
               <a:rPr lang="en-US" smtClean="0"/>
-              <a:t>10/17/23</a:t>
+              <a:t>10/19/23</a:t>
             </a:fld>
             <a:endParaRPr lang="en-US"/>
           </a:p>
@@ -2431,7 +2431,7 @@
           <a:p>
             <a:fld id="{697CBF4A-2AD2-1249-BC5E-D6BCA9656194}" type="datetimeFigureOut">
               <a:rPr lang="en-US" smtClean="0"/>
-              <a:t>10/17/23</a:t>
+              <a:t>10/19/23</a:t>
             </a:fld>
             <a:endParaRPr lang="en-US"/>
           </a:p>
@@ -2544,7 +2544,7 @@
           <a:p>
             <a:fld id="{697CBF4A-2AD2-1249-BC5E-D6BCA9656194}" type="datetimeFigureOut">
               <a:rPr lang="en-US" smtClean="0"/>
-              <a:t>10/17/23</a:t>
+              <a:t>10/19/23</a:t>
             </a:fld>
             <a:endParaRPr lang="en-US"/>
           </a:p>
@@ -2855,7 +2855,7 @@
           <a:p>
             <a:fld id="{697CBF4A-2AD2-1249-BC5E-D6BCA9656194}" type="datetimeFigureOut">
               <a:rPr lang="en-US" smtClean="0"/>
-              <a:t>10/17/23</a:t>
+              <a:t>10/19/23</a:t>
             </a:fld>
             <a:endParaRPr lang="en-US"/>
           </a:p>
@@ -3143,7 +3143,7 @@
           <a:p>
             <a:fld id="{697CBF4A-2AD2-1249-BC5E-D6BCA9656194}" type="datetimeFigureOut">
               <a:rPr lang="en-US" smtClean="0"/>
-              <a:t>10/17/23</a:t>
+              <a:t>10/19/23</a:t>
             </a:fld>
             <a:endParaRPr lang="en-US"/>
           </a:p>
@@ -3384,7 +3384,7 @@
           <a:p>
             <a:fld id="{697CBF4A-2AD2-1249-BC5E-D6BCA9656194}" type="datetimeFigureOut">
               <a:rPr lang="en-US" smtClean="0"/>
-              <a:t>10/17/23</a:t>
+              <a:t>10/19/23</a:t>
             </a:fld>
             <a:endParaRPr lang="en-US"/>
           </a:p>
@@ -3866,8 +3866,8 @@
         </p:nvSpPr>
         <p:spPr>
           <a:xfrm>
-            <a:off x="9028277" y="3433830"/>
-            <a:ext cx="1648057" cy="408824"/>
+            <a:off x="9424061" y="3926651"/>
+            <a:ext cx="841614" cy="408824"/>
           </a:xfrm>
           <a:prstGeom prst="roundRect">
             <a:avLst/>
@@ -3912,15 +3912,15 @@
           </p:cNvPr>
           <p:cNvCxnSpPr>
             <a:cxnSpLocks/>
-            <a:stCxn id="130" idx="2"/>
-            <a:endCxn id="163" idx="0"/>
+            <a:stCxn id="130" idx="3"/>
+            <a:endCxn id="163" idx="1"/>
           </p:cNvCxnSpPr>
           <p:nvPr/>
         </p:nvCxnSpPr>
         <p:spPr>
-          <a:xfrm>
-            <a:off x="9852306" y="3842654"/>
-            <a:ext cx="0" cy="254519"/>
+          <a:xfrm flipV="1">
+            <a:off x="10265675" y="4129621"/>
+            <a:ext cx="429088" cy="1442"/>
           </a:xfrm>
           <a:prstGeom prst="straightConnector1">
             <a:avLst/>
@@ -3965,8 +3965,8 @@
         </p:nvSpPr>
         <p:spPr>
           <a:xfrm>
-            <a:off x="9028277" y="4097173"/>
-            <a:ext cx="1648057" cy="408824"/>
+            <a:off x="10694763" y="3925209"/>
+            <a:ext cx="1014358" cy="408824"/>
           </a:xfrm>
           <a:prstGeom prst="rect">
             <a:avLst/>
@@ -4025,10 +4025,10 @@
         </p:nvGrpSpPr>
         <p:grpSpPr>
           <a:xfrm>
-            <a:off x="301848" y="1292059"/>
-            <a:ext cx="1510185" cy="2310272"/>
-            <a:chOff x="228312" y="565999"/>
-            <a:chExt cx="1510185" cy="2310272"/>
+            <a:off x="301848" y="1137327"/>
+            <a:ext cx="1510185" cy="2615276"/>
+            <a:chOff x="228312" y="411267"/>
+            <a:chExt cx="1510185" cy="2615276"/>
           </a:xfrm>
         </p:grpSpPr>
         <p:sp>
@@ -4564,8 +4564,8 @@
           </p:nvSpPr>
           <p:spPr>
             <a:xfrm>
-              <a:off x="288951" y="565999"/>
-              <a:ext cx="1449546" cy="2310272"/>
+              <a:off x="288951" y="411267"/>
+              <a:ext cx="1449546" cy="2615276"/>
             </a:xfrm>
             <a:prstGeom prst="roundRect">
               <a:avLst>
@@ -4932,8 +4932,8 @@
           </p:nvSpPr>
           <p:spPr>
             <a:xfrm>
-              <a:off x="312995" y="610327"/>
-              <a:ext cx="1425502" cy="307777"/>
+              <a:off x="312995" y="426256"/>
+              <a:ext cx="1425502" cy="523220"/>
             </a:xfrm>
             <a:prstGeom prst="rect">
               <a:avLst/>
@@ -4949,7 +4949,7 @@
               <a:pPr algn="ctr"/>
               <a:r>
                 <a:rPr lang="en-US" sz="1400" b="1" dirty="0"/>
-                <a:t>Sub-sampling</a:t>
+                <a:t>Data Partitioning</a:t>
               </a:r>
             </a:p>
           </p:txBody>
@@ -6287,7 +6287,7 @@
         </p:nvCxnSpPr>
         <p:spPr>
           <a:xfrm>
-            <a:off x="8456024" y="2314699"/>
+            <a:off x="8456024" y="2665028"/>
             <a:ext cx="166" cy="137946"/>
           </a:xfrm>
           <a:prstGeom prst="straightConnector1">
@@ -6330,13 +6330,15 @@
           </p:cNvPr>
           <p:cNvCxnSpPr>
             <a:cxnSpLocks/>
+            <a:stCxn id="27" idx="2"/>
+            <a:endCxn id="209" idx="0"/>
           </p:cNvCxnSpPr>
           <p:nvPr/>
         </p:nvCxnSpPr>
         <p:spPr>
-          <a:xfrm>
-            <a:off x="8453551" y="1150765"/>
-            <a:ext cx="603" cy="152644"/>
+          <a:xfrm flipH="1">
+            <a:off x="8456024" y="1335384"/>
+            <a:ext cx="3061" cy="318354"/>
           </a:xfrm>
           <a:prstGeom prst="straightConnector1">
             <a:avLst/>
@@ -6381,7 +6383,7 @@
         </p:nvSpPr>
         <p:spPr>
           <a:xfrm>
-            <a:off x="7670980" y="2452645"/>
+            <a:off x="7670980" y="2802974"/>
             <a:ext cx="1570420" cy="292230"/>
           </a:xfrm>
           <a:prstGeom prst="rect">
@@ -6468,7 +6470,7 @@
         </p:nvSpPr>
         <p:spPr>
           <a:xfrm>
-            <a:off x="9771163" y="2452645"/>
+            <a:off x="9771163" y="2802974"/>
             <a:ext cx="1572921" cy="292230"/>
           </a:xfrm>
           <a:prstGeom prst="rect">
@@ -6555,7 +6557,7 @@
         </p:nvSpPr>
         <p:spPr>
           <a:xfrm>
-            <a:off x="8257750" y="2872304"/>
+            <a:off x="8257750" y="3222633"/>
             <a:ext cx="396543" cy="287121"/>
           </a:xfrm>
           <a:prstGeom prst="rect">
@@ -6615,7 +6617,7 @@
         </p:nvCxnSpPr>
         <p:spPr>
           <a:xfrm>
-            <a:off x="10557624" y="2744875"/>
+            <a:off x="10557624" y="3095204"/>
             <a:ext cx="1719" cy="124295"/>
           </a:xfrm>
           <a:prstGeom prst="straightConnector1">
@@ -6661,7 +6663,7 @@
         </p:nvSpPr>
         <p:spPr>
           <a:xfrm>
-            <a:off x="10361071" y="2869170"/>
+            <a:off x="10361071" y="3219499"/>
             <a:ext cx="396543" cy="287121"/>
           </a:xfrm>
           <a:prstGeom prst="rect">
@@ -6769,7 +6771,7 @@
         </p:nvSpPr>
         <p:spPr>
           <a:xfrm>
-            <a:off x="8277716" y="862085"/>
+            <a:off x="8277716" y="921464"/>
             <a:ext cx="352803" cy="275242"/>
           </a:xfrm>
           <a:prstGeom prst="can">
@@ -6837,7 +6839,7 @@
         </p:nvSpPr>
         <p:spPr>
           <a:xfrm>
-            <a:off x="8208542" y="1303409"/>
+            <a:off x="8208542" y="1653738"/>
             <a:ext cx="494963" cy="252599"/>
           </a:xfrm>
           <a:prstGeom prst="rect">
@@ -6887,14 +6889,15 @@
           </p:cNvPr>
           <p:cNvCxnSpPr>
             <a:cxnSpLocks/>
+            <a:stCxn id="60" idx="2"/>
             <a:endCxn id="217" idx="0"/>
           </p:cNvCxnSpPr>
           <p:nvPr/>
         </p:nvCxnSpPr>
         <p:spPr>
-          <a:xfrm>
-            <a:off x="10548439" y="1138054"/>
-            <a:ext cx="3453" cy="167512"/>
+          <a:xfrm flipH="1">
+            <a:off x="10551892" y="1333806"/>
+            <a:ext cx="2121" cy="322089"/>
           </a:xfrm>
           <a:prstGeom prst="straightConnector1">
             <a:avLst/>
@@ -6939,8 +6942,8 @@
         </p:nvSpPr>
         <p:spPr>
           <a:xfrm>
-            <a:off x="10372037" y="829236"/>
-            <a:ext cx="352803" cy="308442"/>
+            <a:off x="10375489" y="916385"/>
+            <a:ext cx="352803" cy="282764"/>
           </a:xfrm>
           <a:prstGeom prst="can">
             <a:avLst/>
@@ -7007,7 +7010,7 @@
         </p:nvSpPr>
         <p:spPr>
           <a:xfrm>
-            <a:off x="10304410" y="1305566"/>
+            <a:off x="10304410" y="1655895"/>
             <a:ext cx="494963" cy="250442"/>
           </a:xfrm>
           <a:prstGeom prst="rect">
@@ -7060,7 +7063,7 @@
         </p:nvSpPr>
         <p:spPr>
           <a:xfrm>
-            <a:off x="8279622" y="2006257"/>
+            <a:off x="8279622" y="2356586"/>
             <a:ext cx="352803" cy="308442"/>
           </a:xfrm>
           <a:prstGeom prst="can">
@@ -7128,7 +7131,7 @@
         </p:nvSpPr>
         <p:spPr>
           <a:xfrm>
-            <a:off x="10382941" y="2006257"/>
+            <a:off x="10382941" y="2356586"/>
             <a:ext cx="352803" cy="308442"/>
           </a:xfrm>
           <a:prstGeom prst="can">
@@ -7200,7 +7203,7 @@
         </p:nvCxnSpPr>
         <p:spPr>
           <a:xfrm>
-            <a:off x="8456024" y="1556008"/>
+            <a:off x="8456024" y="1906337"/>
             <a:ext cx="2103319" cy="450249"/>
           </a:xfrm>
           <a:prstGeom prst="straightConnector1">
@@ -7250,7 +7253,7 @@
         </p:nvCxnSpPr>
         <p:spPr>
           <a:xfrm>
-            <a:off x="8456024" y="1556008"/>
+            <a:off x="8456024" y="1906337"/>
             <a:ext cx="0" cy="450249"/>
           </a:xfrm>
           <a:prstGeom prst="straightConnector1">
@@ -7300,7 +7303,7 @@
         </p:nvCxnSpPr>
         <p:spPr>
           <a:xfrm>
-            <a:off x="10551892" y="1556008"/>
+            <a:off x="10551892" y="1906337"/>
             <a:ext cx="7451" cy="450249"/>
           </a:xfrm>
           <a:prstGeom prst="straightConnector1">
@@ -7350,7 +7353,7 @@
         </p:nvCxnSpPr>
         <p:spPr>
           <a:xfrm flipH="1">
-            <a:off x="8456024" y="1556008"/>
+            <a:off x="8456024" y="1906337"/>
             <a:ext cx="2095868" cy="450249"/>
           </a:xfrm>
           <a:prstGeom prst="straightConnector1">
@@ -7400,7 +7403,7 @@
         </p:nvCxnSpPr>
         <p:spPr>
           <a:xfrm flipH="1">
-            <a:off x="10557624" y="2314699"/>
+            <a:off x="10557624" y="2665028"/>
             <a:ext cx="1719" cy="137946"/>
           </a:xfrm>
           <a:prstGeom prst="straightConnector1">
@@ -7550,7 +7553,7 @@
         </p:nvSpPr>
         <p:spPr>
           <a:xfrm>
-            <a:off x="11434602" y="1366989"/>
+            <a:off x="11434602" y="1717318"/>
             <a:ext cx="86952" cy="86952"/>
           </a:xfrm>
           <a:prstGeom prst="ellipse">
@@ -7602,7 +7605,7 @@
         </p:nvSpPr>
         <p:spPr>
           <a:xfrm>
-            <a:off x="11657626" y="1366989"/>
+            <a:off x="11657626" y="1717318"/>
             <a:ext cx="86952" cy="86952"/>
           </a:xfrm>
           <a:prstGeom prst="ellipse">
@@ -7654,7 +7657,7 @@
         </p:nvSpPr>
         <p:spPr>
           <a:xfrm>
-            <a:off x="11882555" y="1366989"/>
+            <a:off x="11882555" y="1717318"/>
             <a:ext cx="86952" cy="86952"/>
           </a:xfrm>
           <a:prstGeom prst="ellipse">
@@ -7706,7 +7709,7 @@
         </p:nvSpPr>
         <p:spPr>
           <a:xfrm>
-            <a:off x="11429590" y="2555284"/>
+            <a:off x="11429590" y="2905613"/>
             <a:ext cx="86952" cy="86952"/>
           </a:xfrm>
           <a:prstGeom prst="ellipse">
@@ -7758,7 +7761,7 @@
         </p:nvSpPr>
         <p:spPr>
           <a:xfrm>
-            <a:off x="11652614" y="2555284"/>
+            <a:off x="11652614" y="2905613"/>
             <a:ext cx="86952" cy="86952"/>
           </a:xfrm>
           <a:prstGeom prst="ellipse">
@@ -7810,7 +7813,7 @@
         </p:nvSpPr>
         <p:spPr>
           <a:xfrm>
-            <a:off x="11877543" y="2555284"/>
+            <a:off x="11877543" y="2905613"/>
             <a:ext cx="86952" cy="86952"/>
           </a:xfrm>
           <a:prstGeom prst="ellipse">
@@ -7862,7 +7865,7 @@
         </p:nvSpPr>
         <p:spPr>
           <a:xfrm>
-            <a:off x="11430679" y="2972474"/>
+            <a:off x="11430679" y="3322803"/>
             <a:ext cx="86952" cy="86952"/>
           </a:xfrm>
           <a:prstGeom prst="ellipse">
@@ -7914,7 +7917,7 @@
         </p:nvSpPr>
         <p:spPr>
           <a:xfrm>
-            <a:off x="11653703" y="2972474"/>
+            <a:off x="11653703" y="3322803"/>
             <a:ext cx="86952" cy="86952"/>
           </a:xfrm>
           <a:prstGeom prst="ellipse">
@@ -7966,7 +7969,7 @@
         </p:nvSpPr>
         <p:spPr>
           <a:xfrm>
-            <a:off x="11878632" y="2972474"/>
+            <a:off x="11878632" y="3322803"/>
             <a:ext cx="86952" cy="86952"/>
           </a:xfrm>
           <a:prstGeom prst="ellipse">
@@ -8021,7 +8024,7 @@
         </p:nvCxnSpPr>
         <p:spPr>
           <a:xfrm flipH="1">
-            <a:off x="8456024" y="1553297"/>
+            <a:off x="8456024" y="1903626"/>
             <a:ext cx="2973697" cy="452960"/>
           </a:xfrm>
           <a:prstGeom prst="straightConnector1">
@@ -8070,7 +8073,7 @@
         </p:nvCxnSpPr>
         <p:spPr>
           <a:xfrm flipH="1">
-            <a:off x="10559343" y="1583158"/>
+            <a:off x="10559343" y="1933487"/>
             <a:ext cx="1149778" cy="423099"/>
           </a:xfrm>
           <a:prstGeom prst="straightConnector1">
@@ -8120,7 +8123,7 @@
         </p:nvCxnSpPr>
         <p:spPr>
           <a:xfrm flipH="1">
-            <a:off x="8456022" y="2744875"/>
+            <a:off x="8456022" y="3095204"/>
             <a:ext cx="168" cy="127429"/>
           </a:xfrm>
           <a:prstGeom prst="straightConnector1">
@@ -8167,7 +8170,7 @@
         <p:spPr>
           <a:xfrm>
             <a:off x="7635539" y="119732"/>
-            <a:ext cx="4419002" cy="3083836"/>
+            <a:ext cx="4419002" cy="3507890"/>
           </a:xfrm>
           <a:prstGeom prst="roundRect">
             <a:avLst>
@@ -8222,7 +8225,7 @@
         <p:spPr>
           <a:xfrm flipV="1">
             <a:off x="1812033" y="2439390"/>
-            <a:ext cx="207866" cy="7805"/>
+            <a:ext cx="207866" cy="5575"/>
           </a:xfrm>
           <a:prstGeom prst="straightConnector1">
             <a:avLst/>
@@ -8267,8 +8270,8 @@
         </p:nvSpPr>
         <p:spPr>
           <a:xfrm>
-            <a:off x="2019900" y="362213"/>
-            <a:ext cx="4485124" cy="307777"/>
+            <a:off x="2025837" y="362213"/>
+            <a:ext cx="5355789" cy="307777"/>
           </a:xfrm>
           <a:prstGeom prst="rect">
             <a:avLst/>
@@ -8284,7 +8287,7 @@
             <a:pPr algn="ctr"/>
             <a:r>
               <a:rPr lang="en-US" sz="1400" b="1" dirty="0"/>
-              <a:t>Determine HAPV</a:t>
+              <a:t>Determine Parameters with Highest ARI (HAPV)</a:t>
             </a:r>
           </a:p>
         </p:txBody>
@@ -8320,7 +8323,7 @@
             <a:pPr algn="ctr"/>
             <a:r>
               <a:rPr lang="en-US" sz="1400" b="1" dirty="0"/>
-              <a:t>Generate Labels</a:t>
+              <a:t>Generate Models Using OI_HAPV &amp; Apply on Partitions</a:t>
             </a:r>
           </a:p>
         </p:txBody>
@@ -8342,9 +8345,9 @@
           <p:nvPr/>
         </p:nvCxnSpPr>
         <p:spPr>
-          <a:xfrm>
-            <a:off x="9845040" y="3203568"/>
-            <a:ext cx="7266" cy="230262"/>
+          <a:xfrm flipH="1">
+            <a:off x="9844868" y="3627622"/>
+            <a:ext cx="172" cy="299029"/>
           </a:xfrm>
           <a:prstGeom prst="straightConnector1">
             <a:avLst/>
@@ -8393,8 +8396,8 @@
         </p:nvCxnSpPr>
         <p:spPr>
           <a:xfrm rot="5400000" flipH="1" flipV="1">
-            <a:off x="3858654" y="-2484823"/>
-            <a:ext cx="1005489" cy="6548277"/>
+            <a:off x="3936020" y="-2562189"/>
+            <a:ext cx="850757" cy="6548277"/>
           </a:xfrm>
           <a:prstGeom prst="bentConnector2">
             <a:avLst/>
@@ -9014,55 +9017,6 @@
           </a:p>
         </p:txBody>
       </p:sp>
-      <p:cxnSp>
-        <p:nvCxnSpPr>
-          <p:cNvPr id="58" name="Straight Arrow Connector 57">
-            <a:extLst>
-              <a:ext uri="{FF2B5EF4-FFF2-40B4-BE49-F238E27FC236}">
-                <a16:creationId xmlns:a16="http://schemas.microsoft.com/office/drawing/2014/main" id="{441345B4-F396-70AA-FBC2-BA2B0FA3BD88}"/>
-              </a:ext>
-            </a:extLst>
-          </p:cNvPr>
-          <p:cNvCxnSpPr>
-            <a:cxnSpLocks/>
-            <a:stCxn id="28" idx="3"/>
-          </p:cNvCxnSpPr>
-          <p:nvPr/>
-        </p:nvCxnSpPr>
-        <p:spPr>
-          <a:xfrm flipV="1">
-            <a:off x="5035622" y="3810799"/>
-            <a:ext cx="195796" cy="1"/>
-          </a:xfrm>
-          <a:prstGeom prst="straightConnector1">
-            <a:avLst/>
-          </a:prstGeom>
-          <a:ln w="19050" cap="flat" cmpd="sng" algn="ctr">
-            <a:solidFill>
-              <a:schemeClr val="tx1"/>
-            </a:solidFill>
-            <a:prstDash val="solid"/>
-            <a:round/>
-            <a:headEnd type="none" w="med" len="med"/>
-            <a:tailEnd type="arrow" w="med" len="med"/>
-          </a:ln>
-          <a:effectLst/>
-        </p:spPr>
-        <p:style>
-          <a:lnRef idx="2">
-            <a:schemeClr val="accent1"/>
-          </a:lnRef>
-          <a:fillRef idx="0">
-            <a:schemeClr val="accent1"/>
-          </a:fillRef>
-          <a:effectRef idx="1">
-            <a:schemeClr val="accent1"/>
-          </a:effectRef>
-          <a:fontRef idx="minor">
-            <a:schemeClr val="tx1"/>
-          </a:fontRef>
-        </p:style>
-      </p:cxnSp>
       <p:sp>
         <p:nvSpPr>
           <p:cNvPr id="453" name="TextBox 452">
@@ -9077,8 +9031,8 @@
         </p:nvSpPr>
         <p:spPr>
           <a:xfrm>
-            <a:off x="5242667" y="1815788"/>
-            <a:ext cx="961151" cy="646331"/>
+            <a:off x="5320176" y="1815788"/>
+            <a:ext cx="820165" cy="646331"/>
           </a:xfrm>
           <a:prstGeom prst="rect">
             <a:avLst/>
@@ -9164,8 +9118,8 @@
         </p:nvSpPr>
         <p:spPr>
           <a:xfrm>
-            <a:off x="5219563" y="673425"/>
-            <a:ext cx="984256" cy="1169551"/>
+            <a:off x="5231439" y="762488"/>
+            <a:ext cx="984256" cy="954107"/>
           </a:xfrm>
           <a:prstGeom prst="rect">
             <a:avLst/>
@@ -9185,7 +9139,23 @@
                   <a:schemeClr val="tx1"/>
                 </a:solidFill>
               </a:rPr>
-              <a:t>Select Parameter Value with Highest ARI</a:t>
+              <a:t>Select </a:t>
+            </a:r>
+            <a:r>
+              <a:rPr lang="en-US" sz="1400" dirty="0" err="1">
+                <a:solidFill>
+                  <a:schemeClr val="tx1"/>
+                </a:solidFill>
+              </a:rPr>
+              <a:t>ArgMax</a:t>
+            </a:r>
+            <a:r>
+              <a:rPr lang="en-US" sz="1400" dirty="0">
+                <a:solidFill>
+                  <a:schemeClr val="tx1"/>
+                </a:solidFill>
+              </a:rPr>
+              <a:t> Parameter Value</a:t>
             </a:r>
           </a:p>
         </p:txBody>
@@ -9201,20 +9171,20 @@
           </p:cNvPr>
           <p:cNvCxnSpPr>
             <a:cxnSpLocks/>
-            <a:stCxn id="486" idx="3"/>
+            <a:stCxn id="42" idx="3"/>
             <a:endCxn id="213" idx="1"/>
           </p:cNvCxnSpPr>
           <p:nvPr/>
         </p:nvCxnSpPr>
         <p:spPr>
           <a:xfrm flipV="1">
-            <a:off x="7298283" y="829236"/>
-            <a:ext cx="3250156" cy="1717805"/>
+            <a:off x="6210405" y="916385"/>
+            <a:ext cx="4341486" cy="1630656"/>
           </a:xfrm>
           <a:prstGeom prst="bentConnector4">
             <a:avLst>
-              <a:gd name="adj1" fmla="val 6648"/>
-              <a:gd name="adj2" fmla="val 113308"/>
+              <a:gd name="adj1" fmla="val 30052"/>
+              <a:gd name="adj2" fmla="val 118933"/>
             </a:avLst>
           </a:prstGeom>
           <a:ln w="38100" cap="flat" cmpd="sng" algn="ctr">
@@ -9256,7 +9226,7 @@
         </p:nvSpPr>
         <p:spPr>
           <a:xfrm>
-            <a:off x="9109557" y="1303409"/>
+            <a:off x="9109557" y="1653738"/>
             <a:ext cx="867790" cy="276999"/>
           </a:xfrm>
           <a:prstGeom prst="rect">
@@ -9301,7 +9271,7 @@
         </p:nvSpPr>
         <p:spPr>
           <a:xfrm>
-            <a:off x="9075082" y="2464372"/>
+            <a:off x="9075082" y="2814701"/>
             <a:ext cx="867790" cy="276999"/>
           </a:xfrm>
           <a:prstGeom prst="rect">
@@ -9426,8 +9396,8 @@
         </p:nvCxnSpPr>
         <p:spPr>
           <a:xfrm>
-            <a:off x="5239493" y="2447619"/>
-            <a:ext cx="970912" cy="9966"/>
+            <a:off x="5320176" y="2497289"/>
+            <a:ext cx="820165" cy="0"/>
           </a:xfrm>
           <a:prstGeom prst="line">
             <a:avLst/>
@@ -9468,9 +9438,9 @@
           <p:nvPr/>
         </p:nvCxnSpPr>
         <p:spPr>
-          <a:xfrm>
-            <a:off x="5231418" y="3201472"/>
-            <a:ext cx="978987" cy="2096"/>
+          <a:xfrm flipV="1">
+            <a:off x="5320176" y="3201472"/>
+            <a:ext cx="820165" cy="1"/>
           </a:xfrm>
           <a:prstGeom prst="line">
             <a:avLst/>
@@ -9512,8 +9482,8 @@
         </p:nvCxnSpPr>
         <p:spPr>
           <a:xfrm>
-            <a:off x="5239493" y="3678806"/>
-            <a:ext cx="970912" cy="8719"/>
+            <a:off x="5320176" y="3707580"/>
+            <a:ext cx="820165" cy="0"/>
           </a:xfrm>
           <a:prstGeom prst="line">
             <a:avLst/>
@@ -9553,8 +9523,8 @@
         </p:nvSpPr>
         <p:spPr>
           <a:xfrm>
-            <a:off x="5252140" y="3709446"/>
-            <a:ext cx="981860" cy="646331"/>
+            <a:off x="5320176" y="3709446"/>
+            <a:ext cx="818136" cy="646331"/>
           </a:xfrm>
           <a:prstGeom prst="rect">
             <a:avLst/>
@@ -9801,9 +9771,9 @@
           <p:nvPr/>
         </p:nvCxnSpPr>
         <p:spPr>
-          <a:xfrm>
-            <a:off x="8453551" y="587080"/>
-            <a:ext cx="567" cy="275005"/>
+          <a:xfrm flipH="1">
+            <a:off x="8454118" y="595874"/>
+            <a:ext cx="1904" cy="325590"/>
           </a:xfrm>
           <a:prstGeom prst="straightConnector1">
             <a:avLst/>
@@ -9853,111 +9823,11 @@
         <p:spPr>
           <a:xfrm flipV="1">
             <a:off x="5028170" y="2138954"/>
-            <a:ext cx="214497" cy="421206"/>
+            <a:ext cx="292006" cy="421206"/>
           </a:xfrm>
           <a:prstGeom prst="bentConnector3">
             <a:avLst>
-              <a:gd name="adj1" fmla="val 21580"/>
-            </a:avLst>
-          </a:prstGeom>
-          <a:ln w="19050" cap="flat" cmpd="sng" algn="ctr">
-            <a:solidFill>
-              <a:schemeClr val="dk1"/>
-            </a:solidFill>
-            <a:prstDash val="solid"/>
-            <a:round/>
-            <a:headEnd type="none" w="med" len="med"/>
-            <a:tailEnd type="arrow" w="med" len="med"/>
-          </a:ln>
-        </p:spPr>
-        <p:style>
-          <a:lnRef idx="0">
-            <a:scrgbClr r="0" g="0" b="0"/>
-          </a:lnRef>
-          <a:fillRef idx="0">
-            <a:scrgbClr r="0" g="0" b="0"/>
-          </a:fillRef>
-          <a:effectRef idx="0">
-            <a:scrgbClr r="0" g="0" b="0"/>
-          </a:effectRef>
-          <a:fontRef idx="minor">
-            <a:schemeClr val="tx1"/>
-          </a:fontRef>
-        </p:style>
-      </p:cxnSp>
-      <p:sp>
-        <p:nvSpPr>
-          <p:cNvPr id="486" name="Rectangle 485">
-            <a:extLst>
-              <a:ext uri="{FF2B5EF4-FFF2-40B4-BE49-F238E27FC236}">
-                <a16:creationId xmlns:a16="http://schemas.microsoft.com/office/drawing/2014/main" id="{4548EAAE-F78C-EEF9-C2FB-CAC9E0EA74EE}"/>
-              </a:ext>
-            </a:extLst>
-          </p:cNvPr>
-          <p:cNvSpPr/>
-          <p:nvPr/>
-        </p:nvSpPr>
-        <p:spPr>
-          <a:xfrm>
-            <a:off x="6360311" y="2400926"/>
-            <a:ext cx="937972" cy="292230"/>
-          </a:xfrm>
-          <a:prstGeom prst="rect">
-            <a:avLst/>
-          </a:prstGeom>
-          <a:noFill/>
-          <a:ln w="19050"/>
-        </p:spPr>
-        <p:style>
-          <a:lnRef idx="2">
-            <a:schemeClr val="dk1"/>
-          </a:lnRef>
-          <a:fillRef idx="1">
-            <a:schemeClr val="lt1"/>
-          </a:fillRef>
-          <a:effectRef idx="0">
-            <a:schemeClr val="dk1"/>
-          </a:effectRef>
-          <a:fontRef idx="minor">
-            <a:schemeClr val="dk1"/>
-          </a:fontRef>
-        </p:style>
-        <p:txBody>
-          <a:bodyPr rtlCol="0" anchor="ctr"/>
-          <a:lstStyle/>
-          <a:p>
-            <a:pPr algn="ctr"/>
-            <a:r>
-              <a:rPr lang="en-US" sz="1600" dirty="0"/>
-              <a:t>OI_HAPV</a:t>
-            </a:r>
-          </a:p>
-        </p:txBody>
-      </p:sp>
-      <p:cxnSp>
-        <p:nvCxnSpPr>
-          <p:cNvPr id="498" name="Elbow Connector 497">
-            <a:extLst>
-              <a:ext uri="{FF2B5EF4-FFF2-40B4-BE49-F238E27FC236}">
-                <a16:creationId xmlns:a16="http://schemas.microsoft.com/office/drawing/2014/main" id="{72F43F64-E640-87DA-3DDE-06B70B4D001D}"/>
-              </a:ext>
-            </a:extLst>
-          </p:cNvPr>
-          <p:cNvCxnSpPr>
-            <a:cxnSpLocks/>
-            <a:stCxn id="94" idx="3"/>
-            <a:endCxn id="453" idx="1"/>
-          </p:cNvCxnSpPr>
-          <p:nvPr/>
-        </p:nvCxnSpPr>
-        <p:spPr>
-          <a:xfrm>
-            <a:off x="5028170" y="1345084"/>
-            <a:ext cx="214497" cy="793870"/>
-          </a:xfrm>
-          <a:prstGeom prst="bentConnector3">
-            <a:avLst>
-              <a:gd name="adj1" fmla="val 21580"/>
+              <a:gd name="adj1" fmla="val 24437"/>
             </a:avLst>
           </a:prstGeom>
           <a:ln w="19050" cap="flat" cmpd="sng" algn="ctr">
@@ -9987,54 +9857,349 @@
       </p:cxnSp>
       <p:cxnSp>
         <p:nvCxnSpPr>
-          <p:cNvPr id="504" name="Straight Arrow Connector 503">
-            <a:extLst>
-              <a:ext uri="{FF2B5EF4-FFF2-40B4-BE49-F238E27FC236}">
-                <a16:creationId xmlns:a16="http://schemas.microsoft.com/office/drawing/2014/main" id="{9A98DF12-5282-3E6B-70F6-4D52FD8D6673}"/>
+          <p:cNvPr id="498" name="Elbow Connector 497">
+            <a:extLst>
+              <a:ext uri="{FF2B5EF4-FFF2-40B4-BE49-F238E27FC236}">
+                <a16:creationId xmlns:a16="http://schemas.microsoft.com/office/drawing/2014/main" id="{72F43F64-E640-87DA-3DDE-06B70B4D001D}"/>
               </a:ext>
             </a:extLst>
           </p:cNvPr>
           <p:cNvCxnSpPr>
             <a:cxnSpLocks/>
-            <a:stCxn id="42" idx="3"/>
-            <a:endCxn id="486" idx="1"/>
+            <a:stCxn id="94" idx="3"/>
+            <a:endCxn id="453" idx="1"/>
           </p:cNvCxnSpPr>
           <p:nvPr/>
         </p:nvCxnSpPr>
         <p:spPr>
           <a:xfrm>
-            <a:off x="6210405" y="2547041"/>
-            <a:ext cx="149906" cy="0"/>
-          </a:xfrm>
-          <a:prstGeom prst="straightConnector1">
-            <a:avLst/>
+            <a:off x="5028170" y="1345084"/>
+            <a:ext cx="292006" cy="793870"/>
+          </a:xfrm>
+          <a:prstGeom prst="bentConnector3">
+            <a:avLst>
+              <a:gd name="adj1" fmla="val 24437"/>
+            </a:avLst>
           </a:prstGeom>
           <a:ln w="19050" cap="flat" cmpd="sng" algn="ctr">
             <a:solidFill>
-              <a:schemeClr val="tx1"/>
+              <a:schemeClr val="dk1"/>
             </a:solidFill>
             <a:prstDash val="solid"/>
             <a:round/>
             <a:headEnd type="none" w="med" len="med"/>
             <a:tailEnd type="arrow" w="med" len="med"/>
           </a:ln>
-          <a:effectLst/>
         </p:spPr>
         <p:style>
-          <a:lnRef idx="2">
-            <a:schemeClr val="accent1"/>
+          <a:lnRef idx="0">
+            <a:scrgbClr r="0" g="0" b="0"/>
           </a:lnRef>
           <a:fillRef idx="0">
-            <a:schemeClr val="accent1"/>
+            <a:scrgbClr r="0" g="0" b="0"/>
           </a:fillRef>
-          <a:effectRef idx="1">
-            <a:schemeClr val="accent1"/>
+          <a:effectRef idx="0">
+            <a:scrgbClr r="0" g="0" b="0"/>
           </a:effectRef>
           <a:fontRef idx="minor">
             <a:schemeClr val="tx1"/>
           </a:fontRef>
         </p:style>
       </p:cxnSp>
+      <p:sp>
+        <p:nvSpPr>
+          <p:cNvPr id="511" name="Rectangle 510">
+            <a:extLst>
+              <a:ext uri="{FF2B5EF4-FFF2-40B4-BE49-F238E27FC236}">
+                <a16:creationId xmlns:a16="http://schemas.microsoft.com/office/drawing/2014/main" id="{5A0CC84F-DC05-AD35-C37F-5A0423A3A4B6}"/>
+              </a:ext>
+            </a:extLst>
+          </p:cNvPr>
+          <p:cNvSpPr/>
+          <p:nvPr/>
+        </p:nvSpPr>
+        <p:spPr>
+          <a:xfrm>
+            <a:off x="5322205" y="1824508"/>
+            <a:ext cx="818136" cy="2531270"/>
+          </a:xfrm>
+          <a:prstGeom prst="rect">
+            <a:avLst/>
+          </a:prstGeom>
+          <a:noFill/>
+          <a:ln>
+            <a:solidFill>
+              <a:schemeClr val="tx1"/>
+            </a:solidFill>
+          </a:ln>
+        </p:spPr>
+        <p:style>
+          <a:lnRef idx="2">
+            <a:schemeClr val="accent1">
+              <a:shade val="15000"/>
+            </a:schemeClr>
+          </a:lnRef>
+          <a:fillRef idx="1">
+            <a:schemeClr val="accent1"/>
+          </a:fillRef>
+          <a:effectRef idx="0">
+            <a:schemeClr val="accent1"/>
+          </a:effectRef>
+          <a:fontRef idx="minor">
+            <a:schemeClr val="lt1"/>
+          </a:fontRef>
+        </p:style>
+        <p:txBody>
+          <a:bodyPr rtlCol="0" anchor="ctr"/>
+          <a:lstStyle/>
+          <a:p>
+            <a:pPr algn="ctr"/>
+            <a:endParaRPr lang="en-US"/>
+          </a:p>
+        </p:txBody>
+      </p:sp>
+      <p:cxnSp>
+        <p:nvCxnSpPr>
+          <p:cNvPr id="99" name="Elbow Connector 98">
+            <a:extLst>
+              <a:ext uri="{FF2B5EF4-FFF2-40B4-BE49-F238E27FC236}">
+                <a16:creationId xmlns:a16="http://schemas.microsoft.com/office/drawing/2014/main" id="{1294D5AB-7F7F-455D-9393-4EBBAD9289E3}"/>
+              </a:ext>
+            </a:extLst>
+          </p:cNvPr>
+          <p:cNvCxnSpPr>
+            <a:cxnSpLocks/>
+            <a:stCxn id="28" idx="3"/>
+            <a:endCxn id="489" idx="1"/>
+          </p:cNvCxnSpPr>
+          <p:nvPr/>
+        </p:nvCxnSpPr>
+        <p:spPr>
+          <a:xfrm>
+            <a:off x="5035622" y="3810800"/>
+            <a:ext cx="284554" cy="221812"/>
+          </a:xfrm>
+          <a:prstGeom prst="bentConnector3">
+            <a:avLst>
+              <a:gd name="adj1" fmla="val 50000"/>
+            </a:avLst>
+          </a:prstGeom>
+          <a:ln w="19050" cap="flat" cmpd="sng" algn="ctr">
+            <a:solidFill>
+              <a:schemeClr val="dk1"/>
+            </a:solidFill>
+            <a:prstDash val="solid"/>
+            <a:round/>
+            <a:headEnd type="none" w="med" len="med"/>
+            <a:tailEnd type="arrow" w="med" len="med"/>
+          </a:ln>
+        </p:spPr>
+        <p:style>
+          <a:lnRef idx="0">
+            <a:scrgbClr r="0" g="0" b="0"/>
+          </a:lnRef>
+          <a:fillRef idx="0">
+            <a:scrgbClr r="0" g="0" b="0"/>
+          </a:fillRef>
+          <a:effectRef idx="0">
+            <a:scrgbClr r="0" g="0" b="0"/>
+          </a:effectRef>
+          <a:fontRef idx="minor">
+            <a:schemeClr val="tx1"/>
+          </a:fontRef>
+        </p:style>
+      </p:cxnSp>
+      <p:sp>
+        <p:nvSpPr>
+          <p:cNvPr id="10" name="TextBox 9">
+            <a:extLst>
+              <a:ext uri="{FF2B5EF4-FFF2-40B4-BE49-F238E27FC236}">
+                <a16:creationId xmlns:a16="http://schemas.microsoft.com/office/drawing/2014/main" id="{4094E3A4-362C-EC8C-3F97-B21295AF9B1A}"/>
+              </a:ext>
+            </a:extLst>
+          </p:cNvPr>
+          <p:cNvSpPr txBox="1"/>
+          <p:nvPr/>
+        </p:nvSpPr>
+        <p:spPr>
+          <a:xfrm>
+            <a:off x="6166538" y="2229783"/>
+            <a:ext cx="1355524" cy="307777"/>
+          </a:xfrm>
+          <a:prstGeom prst="rect">
+            <a:avLst/>
+          </a:prstGeom>
+          <a:noFill/>
+        </p:spPr>
+        <p:txBody>
+          <a:bodyPr wrap="square">
+            <a:spAutoFit/>
+          </a:bodyPr>
+          <a:lstStyle/>
+          <a:p>
+            <a:pPr algn="ctr"/>
+            <a:r>
+              <a:rPr lang="en-US" sz="1400" dirty="0"/>
+              <a:t>OI_HAPV</a:t>
+            </a:r>
+          </a:p>
+        </p:txBody>
+      </p:sp>
+      <p:sp>
+        <p:nvSpPr>
+          <p:cNvPr id="27" name="Card 26">
+            <a:extLst>
+              <a:ext uri="{FF2B5EF4-FFF2-40B4-BE49-F238E27FC236}">
+                <a16:creationId xmlns:a16="http://schemas.microsoft.com/office/drawing/2014/main" id="{CD810C60-B9BA-DAE6-DECB-A554D6FEDC20}"/>
+              </a:ext>
+            </a:extLst>
+          </p:cNvPr>
+          <p:cNvSpPr/>
+          <p:nvPr/>
+        </p:nvSpPr>
+        <p:spPr>
+          <a:xfrm flipH="1">
+            <a:off x="7860358" y="737234"/>
+            <a:ext cx="1197454" cy="598150"/>
+          </a:xfrm>
+          <a:prstGeom prst="flowChartPunchedCard">
+            <a:avLst/>
+          </a:prstGeom>
+          <a:noFill/>
+          <a:ln w="19050">
+            <a:solidFill>
+              <a:schemeClr val="tx1"/>
+            </a:solidFill>
+          </a:ln>
+          <a:effectLst/>
+        </p:spPr>
+        <p:style>
+          <a:lnRef idx="1">
+            <a:schemeClr val="accent1"/>
+          </a:lnRef>
+          <a:fillRef idx="3">
+            <a:schemeClr val="accent1"/>
+          </a:fillRef>
+          <a:effectRef idx="2">
+            <a:schemeClr val="accent1"/>
+          </a:effectRef>
+          <a:fontRef idx="minor">
+            <a:schemeClr val="lt1"/>
+          </a:fontRef>
+        </p:style>
+        <p:txBody>
+          <a:bodyPr rtlCol="0" anchor="ctr"/>
+          <a:lstStyle/>
+          <a:p>
+            <a:pPr algn="ctr"/>
+            <a:endParaRPr lang="en-US" sz="1400" dirty="0">
+              <a:solidFill>
+                <a:schemeClr val="tx1"/>
+              </a:solidFill>
+            </a:endParaRPr>
+          </a:p>
+        </p:txBody>
+      </p:sp>
+      <p:sp>
+        <p:nvSpPr>
+          <p:cNvPr id="59" name="TextBox 58">
+            <a:extLst>
+              <a:ext uri="{FF2B5EF4-FFF2-40B4-BE49-F238E27FC236}">
+                <a16:creationId xmlns:a16="http://schemas.microsoft.com/office/drawing/2014/main" id="{949C4977-8E0E-33B2-9E75-30892BCEB6DD}"/>
+              </a:ext>
+            </a:extLst>
+          </p:cNvPr>
+          <p:cNvSpPr txBox="1"/>
+          <p:nvPr/>
+        </p:nvSpPr>
+        <p:spPr>
+          <a:xfrm>
+            <a:off x="8960903" y="825400"/>
+            <a:ext cx="1086103" cy="461665"/>
+          </a:xfrm>
+          <a:prstGeom prst="rect">
+            <a:avLst/>
+          </a:prstGeom>
+          <a:noFill/>
+        </p:spPr>
+        <p:txBody>
+          <a:bodyPr wrap="square">
+            <a:spAutoFit/>
+          </a:bodyPr>
+          <a:lstStyle/>
+          <a:p>
+            <a:pPr algn="ctr"/>
+            <a:r>
+              <a:rPr lang="en-US" sz="1200" i="1" dirty="0">
+                <a:solidFill>
+                  <a:schemeClr val="tx2"/>
+                </a:solidFill>
+              </a:rPr>
+              <a:t>Run OI_HAPV on Partitions</a:t>
+            </a:r>
+            <a:endParaRPr lang="en-US" sz="1400" i="1" baseline="-25000" dirty="0">
+              <a:solidFill>
+                <a:schemeClr val="tx2"/>
+              </a:solidFill>
+            </a:endParaRPr>
+          </a:p>
+        </p:txBody>
+      </p:sp>
+      <p:sp>
+        <p:nvSpPr>
+          <p:cNvPr id="60" name="Card 59">
+            <a:extLst>
+              <a:ext uri="{FF2B5EF4-FFF2-40B4-BE49-F238E27FC236}">
+                <a16:creationId xmlns:a16="http://schemas.microsoft.com/office/drawing/2014/main" id="{4F7631AA-BA79-CFF0-5852-ADBA63546CFC}"/>
+              </a:ext>
+            </a:extLst>
+          </p:cNvPr>
+          <p:cNvSpPr/>
+          <p:nvPr/>
+        </p:nvSpPr>
+        <p:spPr>
+          <a:xfrm flipH="1">
+            <a:off x="9955286" y="735656"/>
+            <a:ext cx="1197454" cy="598150"/>
+          </a:xfrm>
+          <a:prstGeom prst="flowChartPunchedCard">
+            <a:avLst/>
+          </a:prstGeom>
+          <a:noFill/>
+          <a:ln w="19050">
+            <a:solidFill>
+              <a:schemeClr val="tx1"/>
+            </a:solidFill>
+          </a:ln>
+          <a:effectLst/>
+        </p:spPr>
+        <p:style>
+          <a:lnRef idx="1">
+            <a:schemeClr val="accent1"/>
+          </a:lnRef>
+          <a:fillRef idx="3">
+            <a:schemeClr val="accent1"/>
+          </a:fillRef>
+          <a:effectRef idx="2">
+            <a:schemeClr val="accent1"/>
+          </a:effectRef>
+          <a:fontRef idx="minor">
+            <a:schemeClr val="lt1"/>
+          </a:fontRef>
+        </p:style>
+        <p:txBody>
+          <a:bodyPr rtlCol="0" anchor="ctr"/>
+          <a:lstStyle/>
+          <a:p>
+            <a:pPr algn="ctr"/>
+            <a:endParaRPr lang="en-US" sz="1400" dirty="0">
+              <a:solidFill>
+                <a:schemeClr val="tx1"/>
+              </a:solidFill>
+            </a:endParaRPr>
+          </a:p>
+        </p:txBody>
+      </p:sp>
     </p:spTree>
     <p:extLst>
       <p:ext uri="{BB962C8B-B14F-4D97-AF65-F5344CB8AC3E}">

</xml_diff>

<commit_message>
Multiple updates in figures
</commit_message>
<xml_diff>
--- a/Figures/Arcs/Architecture.pptx
+++ b/Figures/Arcs/Architecture.pptx
@@ -197,7 +197,7 @@
           <a:p>
             <a:fld id="{4F2B3EEC-C8B4-0543-943F-91B3791C5E43}" type="datetimeFigureOut">
               <a:rPr lang="en-US" smtClean="0"/>
-              <a:t>10/24/23</a:t>
+              <a:t>2/21/24</a:t>
             </a:fld>
             <a:endParaRPr lang="en-US"/>
           </a:p>
@@ -734,7 +734,7 @@
           <a:p>
             <a:fld id="{697CBF4A-2AD2-1249-BC5E-D6BCA9656194}" type="datetimeFigureOut">
               <a:rPr lang="en-US" smtClean="0"/>
-              <a:t>10/24/23</a:t>
+              <a:t>2/21/24</a:t>
             </a:fld>
             <a:endParaRPr lang="en-US"/>
           </a:p>
@@ -932,7 +932,7 @@
           <a:p>
             <a:fld id="{697CBF4A-2AD2-1249-BC5E-D6BCA9656194}" type="datetimeFigureOut">
               <a:rPr lang="en-US" smtClean="0"/>
-              <a:t>10/24/23</a:t>
+              <a:t>2/21/24</a:t>
             </a:fld>
             <a:endParaRPr lang="en-US"/>
           </a:p>
@@ -1140,7 +1140,7 @@
           <a:p>
             <a:fld id="{697CBF4A-2AD2-1249-BC5E-D6BCA9656194}" type="datetimeFigureOut">
               <a:rPr lang="en-US" smtClean="0"/>
-              <a:t>10/24/23</a:t>
+              <a:t>2/21/24</a:t>
             </a:fld>
             <a:endParaRPr lang="en-US"/>
           </a:p>
@@ -1338,7 +1338,7 @@
           <a:p>
             <a:fld id="{697CBF4A-2AD2-1249-BC5E-D6BCA9656194}" type="datetimeFigureOut">
               <a:rPr lang="en-US" smtClean="0"/>
-              <a:t>10/24/23</a:t>
+              <a:t>2/21/24</a:t>
             </a:fld>
             <a:endParaRPr lang="en-US"/>
           </a:p>
@@ -1613,7 +1613,7 @@
           <a:p>
             <a:fld id="{697CBF4A-2AD2-1249-BC5E-D6BCA9656194}" type="datetimeFigureOut">
               <a:rPr lang="en-US" smtClean="0"/>
-              <a:t>10/24/23</a:t>
+              <a:t>2/21/24</a:t>
             </a:fld>
             <a:endParaRPr lang="en-US"/>
           </a:p>
@@ -1878,7 +1878,7 @@
           <a:p>
             <a:fld id="{697CBF4A-2AD2-1249-BC5E-D6BCA9656194}" type="datetimeFigureOut">
               <a:rPr lang="en-US" smtClean="0"/>
-              <a:t>10/24/23</a:t>
+              <a:t>2/21/24</a:t>
             </a:fld>
             <a:endParaRPr lang="en-US"/>
           </a:p>
@@ -2290,7 +2290,7 @@
           <a:p>
             <a:fld id="{697CBF4A-2AD2-1249-BC5E-D6BCA9656194}" type="datetimeFigureOut">
               <a:rPr lang="en-US" smtClean="0"/>
-              <a:t>10/24/23</a:t>
+              <a:t>2/21/24</a:t>
             </a:fld>
             <a:endParaRPr lang="en-US"/>
           </a:p>
@@ -2431,7 +2431,7 @@
           <a:p>
             <a:fld id="{697CBF4A-2AD2-1249-BC5E-D6BCA9656194}" type="datetimeFigureOut">
               <a:rPr lang="en-US" smtClean="0"/>
-              <a:t>10/24/23</a:t>
+              <a:t>2/21/24</a:t>
             </a:fld>
             <a:endParaRPr lang="en-US"/>
           </a:p>
@@ -2544,7 +2544,7 @@
           <a:p>
             <a:fld id="{697CBF4A-2AD2-1249-BC5E-D6BCA9656194}" type="datetimeFigureOut">
               <a:rPr lang="en-US" smtClean="0"/>
-              <a:t>10/24/23</a:t>
+              <a:t>2/21/24</a:t>
             </a:fld>
             <a:endParaRPr lang="en-US"/>
           </a:p>
@@ -2855,7 +2855,7 @@
           <a:p>
             <a:fld id="{697CBF4A-2AD2-1249-BC5E-D6BCA9656194}" type="datetimeFigureOut">
               <a:rPr lang="en-US" smtClean="0"/>
-              <a:t>10/24/23</a:t>
+              <a:t>2/21/24</a:t>
             </a:fld>
             <a:endParaRPr lang="en-US"/>
           </a:p>
@@ -3143,7 +3143,7 @@
           <a:p>
             <a:fld id="{697CBF4A-2AD2-1249-BC5E-D6BCA9656194}" type="datetimeFigureOut">
               <a:rPr lang="en-US" smtClean="0"/>
-              <a:t>10/24/23</a:t>
+              <a:t>2/21/24</a:t>
             </a:fld>
             <a:endParaRPr lang="en-US"/>
           </a:p>
@@ -3384,7 +3384,7 @@
           <a:p>
             <a:fld id="{697CBF4A-2AD2-1249-BC5E-D6BCA9656194}" type="datetimeFigureOut">
               <a:rPr lang="en-US" smtClean="0"/>
-              <a:t>10/24/23</a:t>
+              <a:t>2/21/24</a:t>
             </a:fld>
             <a:endParaRPr lang="en-US"/>
           </a:p>
@@ -3846,7 +3846,10 @@
           <a:p>
             <a:pPr algn="ctr"/>
             <a:r>
-              <a:rPr lang="en-US" sz="1200" dirty="0"/>
+              <a:rPr lang="en-US" sz="1200" dirty="0">
+                <a:latin typeface="Times New Roman" panose="02020603050405020304" pitchFamily="18" charset="0"/>
+                <a:cs typeface="Times New Roman" panose="02020603050405020304" pitchFamily="18" charset="0"/>
+              </a:rPr>
               <a:t> </a:t>
             </a:r>
           </a:p>
@@ -3895,7 +3898,10 @@
           <a:p>
             <a:pPr algn="ctr"/>
             <a:r>
-              <a:rPr lang="en-US" sz="1400" b="1" dirty="0"/>
+              <a:rPr lang="en-US" sz="1400" b="1" dirty="0">
+                <a:latin typeface="Times New Roman" panose="02020603050405020304" pitchFamily="18" charset="0"/>
+                <a:cs typeface="Times New Roman" panose="02020603050405020304" pitchFamily="18" charset="0"/>
+              </a:rPr>
               <a:t>Merge Labels</a:t>
             </a:r>
           </a:p>
@@ -3994,7 +4000,10 @@
           <a:p>
             <a:pPr algn="ctr"/>
             <a:r>
-              <a:rPr lang="en-US" sz="1400" b="1" dirty="0"/>
+              <a:rPr lang="en-US" sz="1400" b="1" dirty="0">
+                <a:latin typeface="Times New Roman" panose="02020603050405020304" pitchFamily="18" charset="0"/>
+                <a:cs typeface="Times New Roman" panose="02020603050405020304" pitchFamily="18" charset="0"/>
+              </a:rPr>
               <a:t>Final Output: </a:t>
             </a:r>
           </a:p>
@@ -4002,14 +4011,10 @@
             <a:pPr algn="ctr"/>
             <a:r>
               <a:rPr lang="en-US" sz="1400" b="1" i="1" dirty="0">
-                <a:latin typeface="APPLE CHANCERY" panose="03020702040506060504" pitchFamily="66" charset="-79"/>
-                <a:cs typeface="APPLE CHANCERY" panose="03020702040506060504" pitchFamily="66" charset="-79"/>
-              </a:rPr>
-              <a:t>l</a:t>
-            </a:r>
-            <a:r>
-              <a:rPr lang="en-US" sz="1400" b="1" dirty="0"/>
-              <a:t> </a:t>
+                <a:latin typeface="Times New Roman" panose="02020603050405020304" pitchFamily="18" charset="0"/>
+                <a:cs typeface="Times New Roman" panose="02020603050405020304" pitchFamily="18" charset="0"/>
+              </a:rPr>
+              <a:t>l </a:t>
             </a:r>
           </a:p>
         </p:txBody>
@@ -4043,7 +4048,10 @@
           <a:lstStyle/>
           <a:p>
             <a:r>
-              <a:rPr lang="en-US" sz="1400" dirty="0"/>
+              <a:rPr lang="en-US" sz="1400" dirty="0">
+                <a:latin typeface="Times New Roman" panose="02020603050405020304" pitchFamily="18" charset="0"/>
+                <a:cs typeface="Times New Roman" panose="02020603050405020304" pitchFamily="18" charset="0"/>
+              </a:rPr>
               <a:t>Dataset</a:t>
             </a:r>
           </a:p>
@@ -4099,21 +4107,32 @@
           <a:p>
             <a:pPr algn="ctr"/>
             <a:r>
-              <a:rPr lang="en-US" sz="1200" dirty="0">
+              <a:rPr lang="en-US" sz="1400" dirty="0">
                 <a:solidFill>
                   <a:schemeClr val="bg1"/>
                 </a:solidFill>
+                <a:latin typeface="Times New Roman" panose="02020603050405020304" pitchFamily="18" charset="0"/>
+                <a:cs typeface="Times New Roman" panose="02020603050405020304" pitchFamily="18" charset="0"/>
               </a:rPr>
               <a:t>S</a:t>
             </a:r>
             <a:r>
-              <a:rPr lang="en-US" sz="1200" baseline="-25000" dirty="0">
+              <a:rPr lang="en-US" sz="1400" baseline="-25000" dirty="0">
                 <a:solidFill>
                   <a:schemeClr val="bg1"/>
                 </a:solidFill>
+                <a:latin typeface="Times New Roman" panose="02020603050405020304" pitchFamily="18" charset="0"/>
+                <a:cs typeface="Times New Roman" panose="02020603050405020304" pitchFamily="18" charset="0"/>
               </a:rPr>
               <a:t>1</a:t>
             </a:r>
+            <a:endParaRPr lang="en-US" sz="1200" baseline="-25000" dirty="0">
+              <a:solidFill>
+                <a:schemeClr val="bg1"/>
+              </a:solidFill>
+              <a:latin typeface="Times New Roman" panose="02020603050405020304" pitchFamily="18" charset="0"/>
+              <a:cs typeface="Times New Roman" panose="02020603050405020304" pitchFamily="18" charset="0"/>
+            </a:endParaRPr>
           </a:p>
         </p:txBody>
       </p:sp>
@@ -4171,6 +4190,8 @@
                 <a:solidFill>
                   <a:schemeClr val="bg1"/>
                 </a:solidFill>
+                <a:latin typeface="Times New Roman" panose="02020603050405020304" pitchFamily="18" charset="0"/>
+                <a:cs typeface="Times New Roman" panose="02020603050405020304" pitchFamily="18" charset="0"/>
               </a:rPr>
               <a:t>S</a:t>
             </a:r>
@@ -4179,6 +4200,8 @@
                 <a:solidFill>
                   <a:schemeClr val="bg1"/>
                 </a:solidFill>
+                <a:latin typeface="Times New Roman" panose="02020603050405020304" pitchFamily="18" charset="0"/>
+                <a:cs typeface="Times New Roman" panose="02020603050405020304" pitchFamily="18" charset="0"/>
               </a:rPr>
               <a:t>2</a:t>
             </a:r>
@@ -4186,6 +4209,8 @@
               <a:solidFill>
                 <a:schemeClr val="bg1"/>
               </a:solidFill>
+              <a:latin typeface="Times New Roman" panose="02020603050405020304" pitchFamily="18" charset="0"/>
+              <a:cs typeface="Times New Roman" panose="02020603050405020304" pitchFamily="18" charset="0"/>
             </a:endParaRPr>
           </a:p>
         </p:txBody>
@@ -4244,6 +4269,8 @@
                 <a:solidFill>
                   <a:schemeClr val="bg1"/>
                 </a:solidFill>
+                <a:latin typeface="Times New Roman" panose="02020603050405020304" pitchFamily="18" charset="0"/>
+                <a:cs typeface="Times New Roman" panose="02020603050405020304" pitchFamily="18" charset="0"/>
               </a:rPr>
               <a:t>S</a:t>
             </a:r>
@@ -4252,6 +4279,8 @@
                 <a:solidFill>
                   <a:schemeClr val="bg1"/>
                 </a:solidFill>
+                <a:latin typeface="Times New Roman" panose="02020603050405020304" pitchFamily="18" charset="0"/>
+                <a:cs typeface="Times New Roman" panose="02020603050405020304" pitchFamily="18" charset="0"/>
               </a:rPr>
               <a:t>n</a:t>
             </a:r>
@@ -4311,6 +4340,8 @@
               <a:solidFill>
                 <a:schemeClr val="tx1"/>
               </a:solidFill>
+              <a:latin typeface="Times New Roman" panose="02020603050405020304" pitchFamily="18" charset="0"/>
+              <a:cs typeface="Times New Roman" panose="02020603050405020304" pitchFamily="18" charset="0"/>
             </a:endParaRPr>
           </a:p>
         </p:txBody>
@@ -4368,6 +4399,8 @@
               <a:solidFill>
                 <a:schemeClr val="tx1"/>
               </a:solidFill>
+              <a:latin typeface="Times New Roman" panose="02020603050405020304" pitchFamily="18" charset="0"/>
+              <a:cs typeface="Times New Roman" panose="02020603050405020304" pitchFamily="18" charset="0"/>
             </a:endParaRPr>
           </a:p>
         </p:txBody>
@@ -4425,6 +4458,8 @@
               <a:solidFill>
                 <a:schemeClr val="tx1"/>
               </a:solidFill>
+              <a:latin typeface="Times New Roman" panose="02020603050405020304" pitchFamily="18" charset="0"/>
+              <a:cs typeface="Times New Roman" panose="02020603050405020304" pitchFamily="18" charset="0"/>
             </a:endParaRPr>
           </a:p>
         </p:txBody>
@@ -4479,7 +4514,10 @@
           <a:lstStyle/>
           <a:p>
             <a:pPr algn="ctr"/>
-            <a:endParaRPr lang="en-US"/>
+            <a:endParaRPr lang="en-US">
+              <a:latin typeface="Times New Roman" panose="02020603050405020304" pitchFamily="18" charset="0"/>
+              <a:cs typeface="Times New Roman" panose="02020603050405020304" pitchFamily="18" charset="0"/>
+            </a:endParaRPr>
           </a:p>
         </p:txBody>
       </p:sp>
@@ -4536,6 +4574,8 @@
               <a:solidFill>
                 <a:schemeClr val="tx1"/>
               </a:solidFill>
+              <a:latin typeface="Times New Roman" panose="02020603050405020304" pitchFamily="18" charset="0"/>
+              <a:cs typeface="Times New Roman" panose="02020603050405020304" pitchFamily="18" charset="0"/>
             </a:endParaRPr>
           </a:p>
         </p:txBody>
@@ -4741,7 +4781,10 @@
           <a:lstStyle/>
           <a:p>
             <a:pPr algn="ctr"/>
-            <a:endParaRPr lang="en-US"/>
+            <a:endParaRPr lang="en-US">
+              <a:latin typeface="Times New Roman" panose="02020603050405020304" pitchFamily="18" charset="0"/>
+              <a:cs typeface="Times New Roman" panose="02020603050405020304" pitchFamily="18" charset="0"/>
+            </a:endParaRPr>
           </a:p>
         </p:txBody>
       </p:sp>
@@ -4760,7 +4803,7 @@
         <p:spPr>
           <a:xfrm>
             <a:off x="66099" y="411305"/>
-            <a:ext cx="1425502" cy="523220"/>
+            <a:ext cx="1425502" cy="292388"/>
           </a:xfrm>
           <a:prstGeom prst="rect">
             <a:avLst/>
@@ -4775,7 +4818,10 @@
           <a:p>
             <a:pPr algn="ctr"/>
             <a:r>
-              <a:rPr lang="en-US" sz="1400" b="1" dirty="0"/>
+              <a:rPr lang="en-US" sz="1300" b="1" dirty="0">
+                <a:latin typeface="Times New Roman" panose="02020603050405020304" pitchFamily="18" charset="0"/>
+                <a:cs typeface="Times New Roman" panose="02020603050405020304" pitchFamily="18" charset="0"/>
+              </a:rPr>
               <a:t>Data Partitioning</a:t>
             </a:r>
           </a:p>
@@ -4829,7 +4875,10 @@
           <a:lstStyle/>
           <a:p>
             <a:pPr algn="ctr"/>
-            <a:endParaRPr lang="en-US"/>
+            <a:endParaRPr lang="en-US">
+              <a:latin typeface="Times New Roman" panose="02020603050405020304" pitchFamily="18" charset="0"/>
+              <a:cs typeface="Times New Roman" panose="02020603050405020304" pitchFamily="18" charset="0"/>
+            </a:endParaRPr>
           </a:p>
         </p:txBody>
       </p:sp>
@@ -4881,7 +4930,10 @@
           <a:lstStyle/>
           <a:p>
             <a:pPr algn="ctr"/>
-            <a:endParaRPr lang="en-US"/>
+            <a:endParaRPr lang="en-US">
+              <a:latin typeface="Times New Roman" panose="02020603050405020304" pitchFamily="18" charset="0"/>
+              <a:cs typeface="Times New Roman" panose="02020603050405020304" pitchFamily="18" charset="0"/>
+            </a:endParaRPr>
           </a:p>
         </p:txBody>
       </p:sp>
@@ -4899,8 +4951,8 @@
         </p:nvSpPr>
         <p:spPr>
           <a:xfrm>
-            <a:off x="1830690" y="1263960"/>
-            <a:ext cx="335220" cy="283781"/>
+            <a:off x="1830689" y="1263960"/>
+            <a:ext cx="357725" cy="283781"/>
           </a:xfrm>
           <a:prstGeom prst="can">
             <a:avLst/>
@@ -4939,6 +4991,8 @@
                 <a:solidFill>
                   <a:schemeClr val="bg1"/>
                 </a:solidFill>
+                <a:latin typeface="Times New Roman" panose="02020603050405020304" pitchFamily="18" charset="0"/>
+                <a:cs typeface="Times New Roman" panose="02020603050405020304" pitchFamily="18" charset="0"/>
               </a:rPr>
               <a:t>S</a:t>
             </a:r>
@@ -4947,6 +5001,8 @@
                 <a:solidFill>
                   <a:schemeClr val="bg1"/>
                 </a:solidFill>
+                <a:latin typeface="Times New Roman" panose="02020603050405020304" pitchFamily="18" charset="0"/>
+                <a:cs typeface="Times New Roman" panose="02020603050405020304" pitchFamily="18" charset="0"/>
               </a:rPr>
               <a:t>1</a:t>
             </a:r>
@@ -4968,7 +5024,7 @@
         <p:spPr>
           <a:xfrm>
             <a:off x="1853819" y="2332869"/>
-            <a:ext cx="335220" cy="283781"/>
+            <a:ext cx="342672" cy="283781"/>
           </a:xfrm>
           <a:prstGeom prst="can">
             <a:avLst/>
@@ -5007,6 +5063,8 @@
                 <a:solidFill>
                   <a:schemeClr val="bg1"/>
                 </a:solidFill>
+                <a:latin typeface="Times New Roman" panose="02020603050405020304" pitchFamily="18" charset="0"/>
+                <a:cs typeface="Times New Roman" panose="02020603050405020304" pitchFamily="18" charset="0"/>
               </a:rPr>
               <a:t>S</a:t>
             </a:r>
@@ -5015,6 +5073,8 @@
                 <a:solidFill>
                   <a:schemeClr val="bg1"/>
                 </a:solidFill>
+                <a:latin typeface="Times New Roman" panose="02020603050405020304" pitchFamily="18" charset="0"/>
+                <a:cs typeface="Times New Roman" panose="02020603050405020304" pitchFamily="18" charset="0"/>
               </a:rPr>
               <a:t>2</a:t>
             </a:r>
@@ -5069,7 +5129,10 @@
           <a:lstStyle/>
           <a:p>
             <a:pPr algn="ctr"/>
-            <a:endParaRPr lang="en-US" sz="1200"/>
+            <a:endParaRPr lang="en-US" sz="1200">
+              <a:latin typeface="Times New Roman" panose="02020603050405020304" pitchFamily="18" charset="0"/>
+              <a:cs typeface="Times New Roman" panose="02020603050405020304" pitchFamily="18" charset="0"/>
+            </a:endParaRPr>
           </a:p>
         </p:txBody>
       </p:sp>
@@ -5121,7 +5184,10 @@
           <a:lstStyle/>
           <a:p>
             <a:pPr algn="ctr"/>
-            <a:endParaRPr lang="en-US" sz="1200"/>
+            <a:endParaRPr lang="en-US" sz="1200">
+              <a:latin typeface="Times New Roman" panose="02020603050405020304" pitchFamily="18" charset="0"/>
+              <a:cs typeface="Times New Roman" panose="02020603050405020304" pitchFamily="18" charset="0"/>
+            </a:endParaRPr>
           </a:p>
         </p:txBody>
       </p:sp>
@@ -5175,18 +5241,15 @@
           <a:p>
             <a:pPr algn="ctr"/>
             <a:r>
-              <a:rPr lang="en-US" sz="1400" dirty="0" err="1">
+              <a:rPr lang="en-US" sz="1400" dirty="0">
                 <a:solidFill>
                   <a:schemeClr val="tx1"/>
                 </a:solidFill>
-              </a:rPr>
-              <a:t>KMeans</a:t>
-            </a:r>
-            <a:endParaRPr lang="en-US" sz="1400" dirty="0">
-              <a:solidFill>
-                <a:schemeClr val="tx1"/>
-              </a:solidFill>
-            </a:endParaRPr>
+                <a:latin typeface="Times New Roman" panose="02020603050405020304" pitchFamily="18" charset="0"/>
+                <a:cs typeface="Times New Roman" panose="02020603050405020304" pitchFamily="18" charset="0"/>
+              </a:rPr>
+              <a:t>Validator</a:t>
+            </a:r>
           </a:p>
         </p:txBody>
       </p:sp>
@@ -5244,6 +5307,8 @@
                 <a:solidFill>
                   <a:schemeClr val="tx1"/>
                 </a:solidFill>
+                <a:latin typeface="Times New Roman" panose="02020603050405020304" pitchFamily="18" charset="0"/>
+                <a:cs typeface="Times New Roman" panose="02020603050405020304" pitchFamily="18" charset="0"/>
               </a:rPr>
               <a:t>OI </a:t>
             </a:r>
@@ -5253,7 +5318,8 @@
                   <a:schemeClr val="tx1"/>
                 </a:solidFill>
                 <a:effectLst/>
-                <a:latin typeface="Google Sans"/>
+                <a:latin typeface="Times New Roman" panose="02020603050405020304" pitchFamily="18" charset="0"/>
+                <a:cs typeface="Times New Roman" panose="02020603050405020304" pitchFamily="18" charset="0"/>
               </a:rPr>
               <a:t>⊨</a:t>
             </a:r>
@@ -5263,7 +5329,8 @@
                   <a:srgbClr val="4D5156"/>
                 </a:solidFill>
                 <a:effectLst/>
-                <a:latin typeface="Google Sans"/>
+                <a:latin typeface="Times New Roman" panose="02020603050405020304" pitchFamily="18" charset="0"/>
+                <a:cs typeface="Times New Roman" panose="02020603050405020304" pitchFamily="18" charset="0"/>
               </a:rPr>
               <a:t> </a:t>
             </a:r>
@@ -5272,6 +5339,8 @@
                 <a:solidFill>
                   <a:schemeClr val="tx1"/>
                 </a:solidFill>
+                <a:latin typeface="Times New Roman" panose="02020603050405020304" pitchFamily="18" charset="0"/>
+                <a:cs typeface="Times New Roman" panose="02020603050405020304" pitchFamily="18" charset="0"/>
               </a:rPr>
               <a:t>P</a:t>
             </a:r>
@@ -5280,6 +5349,8 @@
                 <a:solidFill>
                   <a:schemeClr val="tx1"/>
                 </a:solidFill>
+                <a:latin typeface="Times New Roman" panose="02020603050405020304" pitchFamily="18" charset="0"/>
+                <a:cs typeface="Times New Roman" panose="02020603050405020304" pitchFamily="18" charset="0"/>
               </a:rPr>
               <a:t>1</a:t>
             </a:r>
@@ -5288,6 +5359,8 @@
                 <a:solidFill>
                   <a:schemeClr val="tx1"/>
                 </a:solidFill>
+                <a:latin typeface="Times New Roman" panose="02020603050405020304" pitchFamily="18" charset="0"/>
+                <a:cs typeface="Times New Roman" panose="02020603050405020304" pitchFamily="18" charset="0"/>
               </a:rPr>
               <a:t>:v</a:t>
             </a:r>
@@ -5296,6 +5369,8 @@
                 <a:solidFill>
                   <a:schemeClr val="tx1"/>
                 </a:solidFill>
+                <a:latin typeface="Times New Roman" panose="02020603050405020304" pitchFamily="18" charset="0"/>
+                <a:cs typeface="Times New Roman" panose="02020603050405020304" pitchFamily="18" charset="0"/>
               </a:rPr>
               <a:t>1_2</a:t>
             </a:r>
@@ -5352,18 +5427,15 @@
           <a:p>
             <a:pPr algn="ctr"/>
             <a:r>
-              <a:rPr lang="en-US" sz="1400" dirty="0" err="1">
+              <a:rPr lang="en-US" sz="1400" dirty="0">
                 <a:solidFill>
                   <a:schemeClr val="tx1"/>
                 </a:solidFill>
-              </a:rPr>
-              <a:t>KMeans</a:t>
-            </a:r>
-            <a:endParaRPr lang="en-US" sz="1400" dirty="0">
-              <a:solidFill>
-                <a:schemeClr val="tx1"/>
-              </a:solidFill>
-            </a:endParaRPr>
+                <a:latin typeface="Times New Roman" panose="02020603050405020304" pitchFamily="18" charset="0"/>
+                <a:cs typeface="Times New Roman" panose="02020603050405020304" pitchFamily="18" charset="0"/>
+              </a:rPr>
+              <a:t>Validator</a:t>
+            </a:r>
           </a:p>
         </p:txBody>
       </p:sp>
@@ -5385,8 +5457,8 @@
         </p:nvCxnSpPr>
         <p:spPr>
           <a:xfrm flipV="1">
-            <a:off x="2189039" y="2164426"/>
-            <a:ext cx="239055" cy="310334"/>
+            <a:off x="2196491" y="2164426"/>
+            <a:ext cx="231603" cy="310334"/>
           </a:xfrm>
           <a:prstGeom prst="bentConnector3">
             <a:avLst/>
@@ -5434,8 +5506,8 @@
         </p:nvCxnSpPr>
         <p:spPr>
           <a:xfrm>
-            <a:off x="2189039" y="2474760"/>
-            <a:ext cx="231605" cy="504093"/>
+            <a:off x="2196491" y="2474760"/>
+            <a:ext cx="224153" cy="504093"/>
           </a:xfrm>
           <a:prstGeom prst="bentConnector3">
             <a:avLst>
@@ -5485,8 +5557,8 @@
         </p:nvCxnSpPr>
         <p:spPr>
           <a:xfrm flipV="1">
-            <a:off x="2165910" y="920271"/>
-            <a:ext cx="255868" cy="485580"/>
+            <a:off x="2188414" y="920271"/>
+            <a:ext cx="233364" cy="485580"/>
           </a:xfrm>
           <a:prstGeom prst="bentConnector3">
             <a:avLst/>
@@ -5534,8 +5606,8 @@
         </p:nvCxnSpPr>
         <p:spPr>
           <a:xfrm>
-            <a:off x="2165910" y="1405851"/>
-            <a:ext cx="254735" cy="322816"/>
+            <a:off x="2188414" y="1405851"/>
+            <a:ext cx="232231" cy="322816"/>
           </a:xfrm>
           <a:prstGeom prst="bentConnector3">
             <a:avLst>
@@ -5713,7 +5785,10 @@
           <a:lstStyle/>
           <a:p>
             <a:pPr algn="ctr"/>
-            <a:endParaRPr lang="en-US" sz="1200"/>
+            <a:endParaRPr lang="en-US" sz="1200">
+              <a:latin typeface="Times New Roman" panose="02020603050405020304" pitchFamily="18" charset="0"/>
+              <a:cs typeface="Times New Roman" panose="02020603050405020304" pitchFamily="18" charset="0"/>
+            </a:endParaRPr>
           </a:p>
         </p:txBody>
       </p:sp>
@@ -5771,6 +5846,8 @@
                 <a:solidFill>
                   <a:schemeClr val="tx1"/>
                 </a:solidFill>
+                <a:latin typeface="Times New Roman" panose="02020603050405020304" pitchFamily="18" charset="0"/>
+                <a:cs typeface="Times New Roman" panose="02020603050405020304" pitchFamily="18" charset="0"/>
               </a:rPr>
               <a:t>OI </a:t>
             </a:r>
@@ -5780,7 +5857,8 @@
                   <a:schemeClr val="tx1"/>
                 </a:solidFill>
                 <a:effectLst/>
-                <a:latin typeface="Google Sans"/>
+                <a:latin typeface="Times New Roman" panose="02020603050405020304" pitchFamily="18" charset="0"/>
+                <a:cs typeface="Times New Roman" panose="02020603050405020304" pitchFamily="18" charset="0"/>
               </a:rPr>
               <a:t>⊨</a:t>
             </a:r>
@@ -5790,7 +5868,8 @@
                   <a:srgbClr val="4D5156"/>
                 </a:solidFill>
                 <a:effectLst/>
-                <a:latin typeface="Google Sans"/>
+                <a:latin typeface="Times New Roman" panose="02020603050405020304" pitchFamily="18" charset="0"/>
+                <a:cs typeface="Times New Roman" panose="02020603050405020304" pitchFamily="18" charset="0"/>
               </a:rPr>
               <a:t> </a:t>
             </a:r>
@@ -5799,6 +5878,8 @@
                 <a:solidFill>
                   <a:schemeClr val="tx1"/>
                 </a:solidFill>
+                <a:latin typeface="Times New Roman" panose="02020603050405020304" pitchFamily="18" charset="0"/>
+                <a:cs typeface="Times New Roman" panose="02020603050405020304" pitchFamily="18" charset="0"/>
               </a:rPr>
               <a:t>P</a:t>
             </a:r>
@@ -5807,6 +5888,8 @@
                 <a:solidFill>
                   <a:schemeClr val="tx1"/>
                 </a:solidFill>
+                <a:latin typeface="Times New Roman" panose="02020603050405020304" pitchFamily="18" charset="0"/>
+                <a:cs typeface="Times New Roman" panose="02020603050405020304" pitchFamily="18" charset="0"/>
               </a:rPr>
               <a:t>1</a:t>
             </a:r>
@@ -5815,6 +5898,8 @@
                 <a:solidFill>
                   <a:schemeClr val="tx1"/>
                 </a:solidFill>
+                <a:latin typeface="Times New Roman" panose="02020603050405020304" pitchFamily="18" charset="0"/>
+                <a:cs typeface="Times New Roman" panose="02020603050405020304" pitchFamily="18" charset="0"/>
               </a:rPr>
               <a:t>:v</a:t>
             </a:r>
@@ -5823,6 +5908,8 @@
                 <a:solidFill>
                   <a:schemeClr val="tx1"/>
                 </a:solidFill>
+                <a:latin typeface="Times New Roman" panose="02020603050405020304" pitchFamily="18" charset="0"/>
+                <a:cs typeface="Times New Roman" panose="02020603050405020304" pitchFamily="18" charset="0"/>
               </a:rPr>
               <a:t>1_1</a:t>
             </a:r>
@@ -5870,7 +5957,10 @@
           <a:lstStyle/>
           <a:p>
             <a:pPr algn="ctr"/>
-            <a:endParaRPr lang="en-US" sz="1200" dirty="0"/>
+            <a:endParaRPr lang="en-US" sz="1200" dirty="0">
+              <a:latin typeface="Times New Roman" panose="02020603050405020304" pitchFamily="18" charset="0"/>
+              <a:cs typeface="Times New Roman" panose="02020603050405020304" pitchFamily="18" charset="0"/>
+            </a:endParaRPr>
           </a:p>
         </p:txBody>
       </p:sp>
@@ -5889,7 +5979,7 @@
         <p:spPr>
           <a:xfrm>
             <a:off x="3595002" y="1163701"/>
-            <a:ext cx="1046954" cy="307777"/>
+            <a:ext cx="1046954" cy="276999"/>
           </a:xfrm>
           <a:prstGeom prst="rect">
             <a:avLst/>
@@ -5904,11 +5994,17 @@
           <a:p>
             <a:pPr algn="ctr"/>
             <a:r>
-              <a:rPr lang="en-US" sz="1400" dirty="0"/>
+              <a:rPr lang="en-US" sz="1200" dirty="0">
+                <a:latin typeface="Times New Roman" panose="02020603050405020304" pitchFamily="18" charset="0"/>
+                <a:cs typeface="Times New Roman" panose="02020603050405020304" pitchFamily="18" charset="0"/>
+              </a:rPr>
               <a:t>Similarity</a:t>
             </a:r>
             <a:r>
-              <a:rPr lang="en-US" sz="1400" baseline="-25000" dirty="0"/>
+              <a:rPr lang="en-US" sz="1200" baseline="-25000" dirty="0">
+                <a:latin typeface="Times New Roman" panose="02020603050405020304" pitchFamily="18" charset="0"/>
+                <a:cs typeface="Times New Roman" panose="02020603050405020304" pitchFamily="18" charset="0"/>
+              </a:rPr>
               <a:t>1_1</a:t>
             </a:r>
           </a:p>
@@ -6155,45 +6251,66 @@
           <a:p>
             <a:pPr algn="ctr"/>
             <a:r>
-              <a:rPr lang="en-US" sz="1600" dirty="0"/>
+              <a:rPr lang="en-US" sz="1400" dirty="0">
+                <a:latin typeface="Times New Roman" panose="02020603050405020304" pitchFamily="18" charset="0"/>
+                <a:cs typeface="Times New Roman" panose="02020603050405020304" pitchFamily="18" charset="0"/>
+              </a:rPr>
               <a:t>[</a:t>
             </a:r>
             <a:r>
-              <a:rPr lang="en-US" sz="1600" i="1" dirty="0">
-                <a:latin typeface="APPLE CHANCERY" panose="03020702040506060504" pitchFamily="66" charset="-79"/>
-                <a:cs typeface="APPLE CHANCERY" panose="03020702040506060504" pitchFamily="66" charset="-79"/>
+              <a:rPr lang="en-US" sz="1400" i="1" dirty="0">
+                <a:latin typeface="Times New Roman" panose="02020603050405020304" pitchFamily="18" charset="0"/>
+                <a:cs typeface="Times New Roman" panose="02020603050405020304" pitchFamily="18" charset="0"/>
               </a:rPr>
               <a:t>l</a:t>
             </a:r>
             <a:r>
-              <a:rPr lang="en-US" sz="1600" dirty="0"/>
+              <a:rPr lang="en-US" sz="1400" dirty="0">
+                <a:latin typeface="Times New Roman" panose="02020603050405020304" pitchFamily="18" charset="0"/>
+                <a:cs typeface="Times New Roman" panose="02020603050405020304" pitchFamily="18" charset="0"/>
+              </a:rPr>
               <a:t> </a:t>
             </a:r>
             <a:r>
-              <a:rPr lang="en-US" sz="1600" baseline="-25000" dirty="0"/>
+              <a:rPr lang="en-US" sz="1400" baseline="-25000" dirty="0">
+                <a:latin typeface="Times New Roman" panose="02020603050405020304" pitchFamily="18" charset="0"/>
+                <a:cs typeface="Times New Roman" panose="02020603050405020304" pitchFamily="18" charset="0"/>
+              </a:rPr>
               <a:t>S1_M1</a:t>
             </a:r>
             <a:r>
-              <a:rPr lang="en-US" sz="1600" dirty="0"/>
+              <a:rPr lang="en-US" sz="1400" dirty="0">
+                <a:latin typeface="Times New Roman" panose="02020603050405020304" pitchFamily="18" charset="0"/>
+                <a:cs typeface="Times New Roman" panose="02020603050405020304" pitchFamily="18" charset="0"/>
+              </a:rPr>
               <a:t>, </a:t>
             </a:r>
             <a:r>
-              <a:rPr lang="en-US" sz="1600" i="1" dirty="0">
-                <a:latin typeface="APPLE CHANCERY" panose="03020702040506060504" pitchFamily="66" charset="-79"/>
-                <a:cs typeface="APPLE CHANCERY" panose="03020702040506060504" pitchFamily="66" charset="-79"/>
+              <a:rPr lang="en-US" sz="1400" i="1" dirty="0">
+                <a:latin typeface="Times New Roman" panose="02020603050405020304" pitchFamily="18" charset="0"/>
+                <a:cs typeface="Times New Roman" panose="02020603050405020304" pitchFamily="18" charset="0"/>
               </a:rPr>
               <a:t>l</a:t>
             </a:r>
             <a:r>
-              <a:rPr lang="en-US" sz="1600" dirty="0"/>
+              <a:rPr lang="en-US" sz="1400" dirty="0">
+                <a:latin typeface="Times New Roman" panose="02020603050405020304" pitchFamily="18" charset="0"/>
+                <a:cs typeface="Times New Roman" panose="02020603050405020304" pitchFamily="18" charset="0"/>
+              </a:rPr>
               <a:t> </a:t>
             </a:r>
             <a:r>
-              <a:rPr lang="en-US" sz="1600" baseline="-25000" dirty="0"/>
+              <a:rPr lang="en-US" sz="1400" baseline="-25000" dirty="0">
+                <a:latin typeface="Times New Roman" panose="02020603050405020304" pitchFamily="18" charset="0"/>
+                <a:cs typeface="Times New Roman" panose="02020603050405020304" pitchFamily="18" charset="0"/>
+              </a:rPr>
               <a:t>S1_M2</a:t>
             </a:r>
             <a:r>
-              <a:rPr lang="en-US" sz="1600" dirty="0"/>
+              <a:rPr lang="en-US" sz="1400" dirty="0">
+                <a:latin typeface="Times New Roman" panose="02020603050405020304" pitchFamily="18" charset="0"/>
+                <a:cs typeface="Times New Roman" panose="02020603050405020304" pitchFamily="18" charset="0"/>
+              </a:rPr>
               <a:t>,…]</a:t>
             </a:r>
           </a:p>
@@ -6213,7 +6330,7 @@
         </p:nvSpPr>
         <p:spPr>
           <a:xfrm>
-            <a:off x="9049776" y="2359611"/>
+            <a:off x="9049776" y="2294295"/>
             <a:ext cx="1572921" cy="292230"/>
           </a:xfrm>
           <a:prstGeom prst="rect">
@@ -6242,45 +6359,66 @@
           <a:p>
             <a:pPr algn="ctr"/>
             <a:r>
-              <a:rPr lang="en-US" sz="1600" dirty="0"/>
+              <a:rPr lang="en-US" sz="1400" dirty="0">
+                <a:latin typeface="Times New Roman" panose="02020603050405020304" pitchFamily="18" charset="0"/>
+                <a:cs typeface="Times New Roman" panose="02020603050405020304" pitchFamily="18" charset="0"/>
+              </a:rPr>
               <a:t>[</a:t>
             </a:r>
             <a:r>
-              <a:rPr lang="en-US" sz="1600" i="1" dirty="0">
-                <a:latin typeface="APPLE CHANCERY" panose="03020702040506060504" pitchFamily="66" charset="-79"/>
-                <a:cs typeface="APPLE CHANCERY" panose="03020702040506060504" pitchFamily="66" charset="-79"/>
+              <a:rPr lang="en-US" sz="1400" i="1" dirty="0">
+                <a:latin typeface="Times New Roman" panose="02020603050405020304" pitchFamily="18" charset="0"/>
+                <a:cs typeface="Times New Roman" panose="02020603050405020304" pitchFamily="18" charset="0"/>
               </a:rPr>
               <a:t>l</a:t>
             </a:r>
             <a:r>
-              <a:rPr lang="en-US" sz="1600" dirty="0"/>
+              <a:rPr lang="en-US" sz="1400" dirty="0">
+                <a:latin typeface="Times New Roman" panose="02020603050405020304" pitchFamily="18" charset="0"/>
+                <a:cs typeface="Times New Roman" panose="02020603050405020304" pitchFamily="18" charset="0"/>
+              </a:rPr>
               <a:t> </a:t>
             </a:r>
             <a:r>
-              <a:rPr lang="en-US" sz="1600" baseline="-25000" dirty="0"/>
+              <a:rPr lang="en-US" sz="1400" baseline="-25000" dirty="0">
+                <a:latin typeface="Times New Roman" panose="02020603050405020304" pitchFamily="18" charset="0"/>
+                <a:cs typeface="Times New Roman" panose="02020603050405020304" pitchFamily="18" charset="0"/>
+              </a:rPr>
               <a:t>S2_M1</a:t>
             </a:r>
             <a:r>
-              <a:rPr lang="en-US" sz="1600" dirty="0"/>
+              <a:rPr lang="en-US" sz="1400" dirty="0">
+                <a:latin typeface="Times New Roman" panose="02020603050405020304" pitchFamily="18" charset="0"/>
+                <a:cs typeface="Times New Roman" panose="02020603050405020304" pitchFamily="18" charset="0"/>
+              </a:rPr>
               <a:t>, </a:t>
             </a:r>
             <a:r>
-              <a:rPr lang="en-US" sz="1600" i="1" dirty="0">
-                <a:latin typeface="APPLE CHANCERY" panose="03020702040506060504" pitchFamily="66" charset="-79"/>
-                <a:cs typeface="APPLE CHANCERY" panose="03020702040506060504" pitchFamily="66" charset="-79"/>
+              <a:rPr lang="en-US" sz="1400" i="1" dirty="0">
+                <a:latin typeface="Times New Roman" panose="02020603050405020304" pitchFamily="18" charset="0"/>
+                <a:cs typeface="Times New Roman" panose="02020603050405020304" pitchFamily="18" charset="0"/>
               </a:rPr>
               <a:t>l</a:t>
             </a:r>
             <a:r>
-              <a:rPr lang="en-US" sz="1600" dirty="0"/>
+              <a:rPr lang="en-US" sz="1400" dirty="0">
+                <a:latin typeface="Times New Roman" panose="02020603050405020304" pitchFamily="18" charset="0"/>
+                <a:cs typeface="Times New Roman" panose="02020603050405020304" pitchFamily="18" charset="0"/>
+              </a:rPr>
               <a:t> </a:t>
             </a:r>
             <a:r>
-              <a:rPr lang="en-US" sz="1600" baseline="-25000" dirty="0"/>
+              <a:rPr lang="en-US" sz="1400" baseline="-25000" dirty="0">
+                <a:latin typeface="Times New Roman" panose="02020603050405020304" pitchFamily="18" charset="0"/>
+                <a:cs typeface="Times New Roman" panose="02020603050405020304" pitchFamily="18" charset="0"/>
+              </a:rPr>
               <a:t>S2_M2</a:t>
             </a:r>
             <a:r>
-              <a:rPr lang="en-US" sz="1600" dirty="0"/>
+              <a:rPr lang="en-US" sz="1400" dirty="0">
+                <a:latin typeface="Times New Roman" panose="02020603050405020304" pitchFamily="18" charset="0"/>
+                <a:cs typeface="Times New Roman" panose="02020603050405020304" pitchFamily="18" charset="0"/>
+              </a:rPr>
               <a:t>,…]</a:t>
             </a:r>
           </a:p>
@@ -6330,13 +6468,16 @@
             <a:pPr algn="ctr"/>
             <a:r>
               <a:rPr lang="en-US" sz="1600" i="1" dirty="0">
-                <a:latin typeface="APPLE CHANCERY" panose="03020702040506060504" pitchFamily="66" charset="-79"/>
-                <a:cs typeface="APPLE CHANCERY" panose="03020702040506060504" pitchFamily="66" charset="-79"/>
+                <a:latin typeface="Times New Roman" panose="02020603050405020304" pitchFamily="18" charset="0"/>
+                <a:cs typeface="Times New Roman" panose="02020603050405020304" pitchFamily="18" charset="0"/>
               </a:rPr>
               <a:t>l</a:t>
             </a:r>
             <a:r>
-              <a:rPr lang="en-US" sz="1600" i="1" baseline="-25000" dirty="0"/>
+              <a:rPr lang="en-US" sz="1600" i="1" baseline="-25000" dirty="0">
+                <a:latin typeface="Times New Roman" panose="02020603050405020304" pitchFamily="18" charset="0"/>
+                <a:cs typeface="Times New Roman" panose="02020603050405020304" pitchFamily="18" charset="0"/>
+              </a:rPr>
               <a:t>1</a:t>
             </a:r>
           </a:p>
@@ -6360,7 +6501,7 @@
         </p:nvCxnSpPr>
         <p:spPr>
           <a:xfrm flipV="1">
-            <a:off x="10622697" y="2504026"/>
+            <a:off x="10622697" y="2438710"/>
             <a:ext cx="157493" cy="1700"/>
           </a:xfrm>
           <a:prstGeom prst="straightConnector1">
@@ -6406,7 +6547,7 @@
         </p:nvSpPr>
         <p:spPr>
           <a:xfrm>
-            <a:off x="10780190" y="2360465"/>
+            <a:off x="10780190" y="2295149"/>
             <a:ext cx="396543" cy="287121"/>
           </a:xfrm>
           <a:prstGeom prst="rect">
@@ -6436,13 +6577,16 @@
             <a:pPr algn="ctr"/>
             <a:r>
               <a:rPr lang="en-US" sz="1600" i="1" dirty="0">
-                <a:latin typeface="APPLE CHANCERY" panose="03020702040506060504" pitchFamily="66" charset="-79"/>
-                <a:cs typeface="APPLE CHANCERY" panose="03020702040506060504" pitchFamily="66" charset="-79"/>
+                <a:latin typeface="Times New Roman" panose="02020603050405020304" pitchFamily="18" charset="0"/>
+                <a:cs typeface="Times New Roman" panose="02020603050405020304" pitchFamily="18" charset="0"/>
               </a:rPr>
               <a:t>l</a:t>
             </a:r>
             <a:r>
-              <a:rPr lang="en-US" sz="1600" i="1" baseline="-25000" dirty="0"/>
+              <a:rPr lang="en-US" sz="1600" i="1" baseline="-25000" dirty="0">
+                <a:latin typeface="Times New Roman" panose="02020603050405020304" pitchFamily="18" charset="0"/>
+                <a:cs typeface="Times New Roman" panose="02020603050405020304" pitchFamily="18" charset="0"/>
+              </a:rPr>
               <a:t>2</a:t>
             </a:r>
           </a:p>
@@ -6502,6 +6646,8 @@
                 <a:solidFill>
                   <a:schemeClr val="bg1"/>
                 </a:solidFill>
+                <a:latin typeface="Times New Roman" panose="02020603050405020304" pitchFamily="18" charset="0"/>
+                <a:cs typeface="Times New Roman" panose="02020603050405020304" pitchFamily="18" charset="0"/>
               </a:rPr>
               <a:t>S</a:t>
             </a:r>
@@ -6510,6 +6656,8 @@
                 <a:solidFill>
                   <a:schemeClr val="bg1"/>
                 </a:solidFill>
+                <a:latin typeface="Times New Roman" panose="02020603050405020304" pitchFamily="18" charset="0"/>
+                <a:cs typeface="Times New Roman" panose="02020603050405020304" pitchFamily="18" charset="0"/>
               </a:rPr>
               <a:t>1</a:t>
             </a:r>
@@ -6559,11 +6707,17 @@
           <a:p>
             <a:pPr algn="ctr"/>
             <a:r>
-              <a:rPr lang="en-US" sz="1400" dirty="0"/>
+              <a:rPr lang="en-US" sz="1400" dirty="0">
+                <a:latin typeface="Times New Roman" panose="02020603050405020304" pitchFamily="18" charset="0"/>
+                <a:cs typeface="Times New Roman" panose="02020603050405020304" pitchFamily="18" charset="0"/>
+              </a:rPr>
               <a:t>M</a:t>
             </a:r>
             <a:r>
-              <a:rPr lang="en-US" sz="1400" baseline="-25000" dirty="0"/>
+              <a:rPr lang="en-US" sz="1400" baseline="-25000" dirty="0">
+                <a:latin typeface="Times New Roman" panose="02020603050405020304" pitchFamily="18" charset="0"/>
+                <a:cs typeface="Times New Roman" panose="02020603050405020304" pitchFamily="18" charset="0"/>
+              </a:rPr>
               <a:t>1</a:t>
             </a:r>
           </a:p>
@@ -6587,7 +6741,7 @@
         </p:nvCxnSpPr>
         <p:spPr>
           <a:xfrm flipV="1">
-            <a:off x="7216880" y="2506237"/>
+            <a:off x="7216880" y="2440921"/>
             <a:ext cx="205651" cy="643"/>
           </a:xfrm>
           <a:prstGeom prst="straightConnector1">
@@ -6633,7 +6787,7 @@
         </p:nvSpPr>
         <p:spPr>
           <a:xfrm>
-            <a:off x="6677261" y="2388534"/>
+            <a:off x="6677261" y="2323218"/>
             <a:ext cx="352803" cy="282764"/>
           </a:xfrm>
           <a:prstGeom prst="can">
@@ -6673,6 +6827,8 @@
                 <a:solidFill>
                   <a:schemeClr val="bg1"/>
                 </a:solidFill>
+                <a:latin typeface="Times New Roman" panose="02020603050405020304" pitchFamily="18" charset="0"/>
+                <a:cs typeface="Times New Roman" panose="02020603050405020304" pitchFamily="18" charset="0"/>
               </a:rPr>
               <a:t>S</a:t>
             </a:r>
@@ -6681,6 +6837,8 @@
                 <a:solidFill>
                   <a:schemeClr val="bg1"/>
                 </a:solidFill>
+                <a:latin typeface="Times New Roman" panose="02020603050405020304" pitchFamily="18" charset="0"/>
+                <a:cs typeface="Times New Roman" panose="02020603050405020304" pitchFamily="18" charset="0"/>
               </a:rPr>
               <a:t>2</a:t>
             </a:r>
@@ -6701,7 +6859,7 @@
         </p:nvSpPr>
         <p:spPr>
           <a:xfrm>
-            <a:off x="7422531" y="2381016"/>
+            <a:off x="7422531" y="2315700"/>
             <a:ext cx="494963" cy="250442"/>
           </a:xfrm>
           <a:prstGeom prst="rect">
@@ -6730,11 +6888,17 @@
           <a:p>
             <a:pPr algn="ctr"/>
             <a:r>
-              <a:rPr lang="en-US" sz="1400" dirty="0"/>
+              <a:rPr lang="en-US" sz="1400" dirty="0">
+                <a:latin typeface="Times New Roman" panose="02020603050405020304" pitchFamily="18" charset="0"/>
+                <a:cs typeface="Times New Roman" panose="02020603050405020304" pitchFamily="18" charset="0"/>
+              </a:rPr>
               <a:t>M</a:t>
             </a:r>
             <a:r>
-              <a:rPr lang="en-US" sz="1400" baseline="-25000" dirty="0"/>
+              <a:rPr lang="en-US" sz="1400" baseline="-25000" dirty="0">
+                <a:latin typeface="Times New Roman" panose="02020603050405020304" pitchFamily="18" charset="0"/>
+                <a:cs typeface="Times New Roman" panose="02020603050405020304" pitchFamily="18" charset="0"/>
+              </a:rPr>
               <a:t>2</a:t>
             </a:r>
           </a:p>
@@ -6794,6 +6958,8 @@
                 <a:solidFill>
                   <a:schemeClr val="bg1"/>
                 </a:solidFill>
+                <a:latin typeface="Times New Roman" panose="02020603050405020304" pitchFamily="18" charset="0"/>
+                <a:cs typeface="Times New Roman" panose="02020603050405020304" pitchFamily="18" charset="0"/>
               </a:rPr>
               <a:t>S</a:t>
             </a:r>
@@ -6802,6 +6968,8 @@
                 <a:solidFill>
                   <a:schemeClr val="bg1"/>
                 </a:solidFill>
+                <a:latin typeface="Times New Roman" panose="02020603050405020304" pitchFamily="18" charset="0"/>
+                <a:cs typeface="Times New Roman" panose="02020603050405020304" pitchFamily="18" charset="0"/>
               </a:rPr>
               <a:t>1</a:t>
             </a:r>
@@ -6822,7 +6990,7 @@
         </p:nvSpPr>
         <p:spPr>
           <a:xfrm>
-            <a:off x="8555687" y="2350316"/>
+            <a:off x="8555687" y="2285000"/>
             <a:ext cx="352803" cy="308442"/>
           </a:xfrm>
           <a:prstGeom prst="can">
@@ -6862,6 +7030,8 @@
                 <a:solidFill>
                   <a:schemeClr val="bg1"/>
                 </a:solidFill>
+                <a:latin typeface="Times New Roman" panose="02020603050405020304" pitchFamily="18" charset="0"/>
+                <a:cs typeface="Times New Roman" panose="02020603050405020304" pitchFamily="18" charset="0"/>
               </a:rPr>
               <a:t>S</a:t>
             </a:r>
@@ -6870,6 +7040,8 @@
                 <a:solidFill>
                   <a:schemeClr val="bg1"/>
                 </a:solidFill>
+                <a:latin typeface="Times New Roman" panose="02020603050405020304" pitchFamily="18" charset="0"/>
+                <a:cs typeface="Times New Roman" panose="02020603050405020304" pitchFamily="18" charset="0"/>
               </a:rPr>
               <a:t>2</a:t>
             </a:r>
@@ -6895,7 +7067,7 @@
         <p:spPr>
           <a:xfrm>
             <a:off x="7917494" y="1436261"/>
-            <a:ext cx="638193" cy="1068276"/>
+            <a:ext cx="638193" cy="1002960"/>
           </a:xfrm>
           <a:prstGeom prst="straightConnector1">
             <a:avLst/>
@@ -6994,7 +7166,7 @@
         </p:nvCxnSpPr>
         <p:spPr>
           <a:xfrm flipV="1">
-            <a:off x="7917494" y="2504537"/>
+            <a:off x="7917494" y="2439221"/>
             <a:ext cx="638193" cy="1700"/>
           </a:xfrm>
           <a:prstGeom prst="straightConnector1">
@@ -7045,7 +7217,7 @@
         <p:spPr>
           <a:xfrm flipV="1">
             <a:off x="7917494" y="1436812"/>
-            <a:ext cx="641743" cy="1069425"/>
+            <a:ext cx="641743" cy="1004109"/>
           </a:xfrm>
           <a:prstGeom prst="straightConnector1">
             <a:avLst/>
@@ -7094,7 +7266,7 @@
         </p:nvCxnSpPr>
         <p:spPr>
           <a:xfrm>
-            <a:off x="8908490" y="2504537"/>
+            <a:off x="8908490" y="2439221"/>
             <a:ext cx="141286" cy="1189"/>
           </a:xfrm>
           <a:prstGeom prst="straightConnector1">
@@ -7192,7 +7364,7 @@
         </p:nvCxnSpPr>
         <p:spPr>
           <a:xfrm flipV="1">
-            <a:off x="7878167" y="2504537"/>
+            <a:off x="7878167" y="2439221"/>
             <a:ext cx="677520" cy="931220"/>
           </a:xfrm>
           <a:prstGeom prst="straightConnector1">
@@ -7319,7 +7491,10 @@
           <a:p>
             <a:pPr algn="ctr"/>
             <a:r>
-              <a:rPr lang="en-US" dirty="0"/>
+              <a:rPr lang="en-US" dirty="0">
+                <a:latin typeface="Times New Roman" panose="02020603050405020304" pitchFamily="18" charset="0"/>
+                <a:cs typeface="Times New Roman" panose="02020603050405020304" pitchFamily="18" charset="0"/>
+              </a:rPr>
               <a:t> </a:t>
             </a:r>
           </a:p>
@@ -7388,8 +7563,8 @@
         </p:nvSpPr>
         <p:spPr>
           <a:xfrm>
-            <a:off x="1697891" y="400088"/>
-            <a:ext cx="4183282" cy="307777"/>
+            <a:off x="1536196" y="400088"/>
+            <a:ext cx="4466787" cy="292388"/>
           </a:xfrm>
           <a:prstGeom prst="rect">
             <a:avLst/>
@@ -7404,7 +7579,10 @@
           <a:p>
             <a:pPr algn="ctr"/>
             <a:r>
-              <a:rPr lang="en-US" sz="1400" b="1" dirty="0"/>
+              <a:rPr lang="en-US" sz="1300" b="1" dirty="0">
+                <a:latin typeface="Times New Roman" panose="02020603050405020304" pitchFamily="18" charset="0"/>
+                <a:cs typeface="Times New Roman" panose="02020603050405020304" pitchFamily="18" charset="0"/>
+              </a:rPr>
               <a:t>Determine Hyper-Parameters with Highest ARI (HAPV)</a:t>
             </a:r>
           </a:p>
@@ -7425,7 +7603,7 @@
         <p:spPr>
           <a:xfrm>
             <a:off x="8029433" y="415240"/>
-            <a:ext cx="2634101" cy="523220"/>
+            <a:ext cx="2634101" cy="492443"/>
           </a:xfrm>
           <a:prstGeom prst="rect">
             <a:avLst/>
@@ -7440,7 +7618,10 @@
           <a:p>
             <a:pPr algn="ctr"/>
             <a:r>
-              <a:rPr lang="en-US" sz="1400" b="1" dirty="0"/>
+              <a:rPr lang="en-US" sz="1300" b="1" dirty="0">
+                <a:latin typeface="Times New Roman" panose="02020603050405020304" pitchFamily="18" charset="0"/>
+                <a:cs typeface="Times New Roman" panose="02020603050405020304" pitchFamily="18" charset="0"/>
+              </a:rPr>
               <a:t>Apply Models on Partitions to Generate Labels</a:t>
             </a:r>
           </a:p>
@@ -7469,7 +7650,7 @@
           </a:xfrm>
           <a:prstGeom prst="bentConnector3">
             <a:avLst>
-              <a:gd name="adj1" fmla="val -2555703"/>
+              <a:gd name="adj1" fmla="val -3903310"/>
             </a:avLst>
           </a:prstGeom>
           <a:ln w="38100" cap="flat" cmpd="sng" algn="ctr">
@@ -7553,6 +7734,8 @@
                 <a:solidFill>
                   <a:schemeClr val="bg1"/>
                 </a:solidFill>
+                <a:latin typeface="Times New Roman" panose="02020603050405020304" pitchFamily="18" charset="0"/>
+                <a:cs typeface="Times New Roman" panose="02020603050405020304" pitchFamily="18" charset="0"/>
               </a:rPr>
               <a:t>S</a:t>
             </a:r>
@@ -7561,6 +7744,8 @@
                 <a:solidFill>
                   <a:schemeClr val="bg1"/>
                 </a:solidFill>
+                <a:latin typeface="Times New Roman" panose="02020603050405020304" pitchFamily="18" charset="0"/>
+                <a:cs typeface="Times New Roman" panose="02020603050405020304" pitchFamily="18" charset="0"/>
               </a:rPr>
               <a:t>i</a:t>
             </a:r>
@@ -7621,6 +7806,8 @@
                 <a:solidFill>
                   <a:schemeClr val="tx1"/>
                 </a:solidFill>
+                <a:latin typeface="Times New Roman" panose="02020603050405020304" pitchFamily="18" charset="0"/>
+                <a:cs typeface="Times New Roman" panose="02020603050405020304" pitchFamily="18" charset="0"/>
               </a:rPr>
               <a:t>OI </a:t>
             </a:r>
@@ -7630,7 +7817,8 @@
                   <a:schemeClr val="tx1"/>
                 </a:solidFill>
                 <a:effectLst/>
-                <a:latin typeface="Google Sans"/>
+                <a:latin typeface="Times New Roman" panose="02020603050405020304" pitchFamily="18" charset="0"/>
+                <a:cs typeface="Times New Roman" panose="02020603050405020304" pitchFamily="18" charset="0"/>
               </a:rPr>
               <a:t>⊨</a:t>
             </a:r>
@@ -7640,7 +7828,8 @@
                   <a:srgbClr val="4D5156"/>
                 </a:solidFill>
                 <a:effectLst/>
-                <a:latin typeface="Google Sans"/>
+                <a:latin typeface="Times New Roman" panose="02020603050405020304" pitchFamily="18" charset="0"/>
+                <a:cs typeface="Times New Roman" panose="02020603050405020304" pitchFamily="18" charset="0"/>
               </a:rPr>
               <a:t> </a:t>
             </a:r>
@@ -7649,6 +7838,8 @@
                 <a:solidFill>
                   <a:schemeClr val="tx1"/>
                 </a:solidFill>
+                <a:latin typeface="Times New Roman" panose="02020603050405020304" pitchFamily="18" charset="0"/>
+                <a:cs typeface="Times New Roman" panose="02020603050405020304" pitchFamily="18" charset="0"/>
               </a:rPr>
               <a:t>P</a:t>
             </a:r>
@@ -7657,6 +7848,8 @@
                 <a:solidFill>
                   <a:schemeClr val="tx1"/>
                 </a:solidFill>
+                <a:latin typeface="Times New Roman" panose="02020603050405020304" pitchFamily="18" charset="0"/>
+                <a:cs typeface="Times New Roman" panose="02020603050405020304" pitchFamily="18" charset="0"/>
               </a:rPr>
               <a:t>r</a:t>
             </a:r>
@@ -7665,6 +7858,8 @@
                 <a:solidFill>
                   <a:schemeClr val="tx1"/>
                 </a:solidFill>
+                <a:latin typeface="Times New Roman" panose="02020603050405020304" pitchFamily="18" charset="0"/>
+                <a:cs typeface="Times New Roman" panose="02020603050405020304" pitchFamily="18" charset="0"/>
               </a:rPr>
               <a:t>:v</a:t>
             </a:r>
@@ -7673,6 +7868,8 @@
                 <a:solidFill>
                   <a:schemeClr val="tx1"/>
                 </a:solidFill>
+                <a:latin typeface="Times New Roman" panose="02020603050405020304" pitchFamily="18" charset="0"/>
+                <a:cs typeface="Times New Roman" panose="02020603050405020304" pitchFamily="18" charset="0"/>
               </a:rPr>
               <a:t>r_h</a:t>
             </a:r>
@@ -7680,6 +7877,8 @@
               <a:solidFill>
                 <a:schemeClr val="tx1"/>
               </a:solidFill>
+              <a:latin typeface="Times New Roman" panose="02020603050405020304" pitchFamily="18" charset="0"/>
+              <a:cs typeface="Times New Roman" panose="02020603050405020304" pitchFamily="18" charset="0"/>
             </a:endParaRPr>
           </a:p>
         </p:txBody>
@@ -7734,17 +7933,21 @@
           <a:p>
             <a:pPr algn="ctr"/>
             <a:r>
-              <a:rPr lang="en-US" sz="1400" dirty="0" err="1">
+              <a:rPr lang="en-US" sz="1400">
                 <a:solidFill>
                   <a:schemeClr val="tx1"/>
                 </a:solidFill>
-              </a:rPr>
-              <a:t>KMeans</a:t>
+                <a:latin typeface="Times New Roman" panose="02020603050405020304" pitchFamily="18" charset="0"/>
+                <a:cs typeface="Times New Roman" panose="02020603050405020304" pitchFamily="18" charset="0"/>
+              </a:rPr>
+              <a:t>Validator</a:t>
             </a:r>
             <a:endParaRPr lang="en-US" sz="1400" dirty="0">
               <a:solidFill>
                 <a:schemeClr val="tx1"/>
               </a:solidFill>
+              <a:latin typeface="Times New Roman" panose="02020603050405020304" pitchFamily="18" charset="0"/>
+              <a:cs typeface="Times New Roman" panose="02020603050405020304" pitchFamily="18" charset="0"/>
             </a:endParaRPr>
           </a:p>
         </p:txBody>
@@ -7961,8 +8164,8 @@
         </p:nvSpPr>
         <p:spPr>
           <a:xfrm>
-            <a:off x="4931086" y="1062990"/>
-            <a:ext cx="827403" cy="3008264"/>
+            <a:off x="4931086" y="854619"/>
+            <a:ext cx="827403" cy="3216635"/>
           </a:xfrm>
           <a:prstGeom prst="rect">
             <a:avLst/>
@@ -7995,7 +8198,10 @@
           <a:lstStyle/>
           <a:p>
             <a:pPr algn="ctr"/>
-            <a:endParaRPr lang="en-US"/>
+            <a:endParaRPr lang="en-US">
+              <a:latin typeface="Times New Roman" panose="02020603050405020304" pitchFamily="18" charset="0"/>
+              <a:cs typeface="Times New Roman" panose="02020603050405020304" pitchFamily="18" charset="0"/>
+            </a:endParaRPr>
           </a:p>
         </p:txBody>
       </p:sp>
@@ -8013,7 +8219,7 @@
         </p:nvSpPr>
         <p:spPr>
           <a:xfrm>
-            <a:off x="5016267" y="2555163"/>
+            <a:off x="5016267" y="2437361"/>
             <a:ext cx="655943" cy="276999"/>
           </a:xfrm>
           <a:prstGeom prst="rect">
@@ -8033,6 +8239,8 @@
                 <a:solidFill>
                   <a:schemeClr val="tx1"/>
                 </a:solidFill>
+                <a:latin typeface="Times New Roman" panose="02020603050405020304" pitchFamily="18" charset="0"/>
+                <a:cs typeface="Times New Roman" panose="02020603050405020304" pitchFamily="18" charset="0"/>
               </a:rPr>
               <a:t>P</a:t>
             </a:r>
@@ -8041,6 +8249,8 @@
                 <a:solidFill>
                   <a:schemeClr val="tx1"/>
                 </a:solidFill>
+                <a:latin typeface="Times New Roman" panose="02020603050405020304" pitchFamily="18" charset="0"/>
+                <a:cs typeface="Times New Roman" panose="02020603050405020304" pitchFamily="18" charset="0"/>
               </a:rPr>
               <a:t>1</a:t>
             </a:r>
@@ -8049,6 +8259,8 @@
                 <a:solidFill>
                   <a:schemeClr val="tx1"/>
                 </a:solidFill>
+                <a:latin typeface="Times New Roman" panose="02020603050405020304" pitchFamily="18" charset="0"/>
+                <a:cs typeface="Times New Roman" panose="02020603050405020304" pitchFamily="18" charset="0"/>
               </a:rPr>
               <a:t>:v</a:t>
             </a:r>
@@ -8057,6 +8269,8 @@
                 <a:solidFill>
                   <a:schemeClr val="tx1"/>
                 </a:solidFill>
+                <a:latin typeface="Times New Roman" panose="02020603050405020304" pitchFamily="18" charset="0"/>
+                <a:cs typeface="Times New Roman" panose="02020603050405020304" pitchFamily="18" charset="0"/>
               </a:rPr>
               <a:t>1_2</a:t>
             </a:r>
@@ -8077,7 +8291,7 @@
         </p:nvSpPr>
         <p:spPr>
           <a:xfrm>
-            <a:off x="4857714" y="1025333"/>
+            <a:off x="4856791" y="873966"/>
             <a:ext cx="967003" cy="1384995"/>
           </a:xfrm>
           <a:prstGeom prst="rect">
@@ -8097,6 +8311,8 @@
                 <a:solidFill>
                   <a:schemeClr val="tx1"/>
                 </a:solidFill>
+                <a:latin typeface="Times New Roman" panose="02020603050405020304" pitchFamily="18" charset="0"/>
+                <a:cs typeface="Times New Roman" panose="02020603050405020304" pitchFamily="18" charset="0"/>
               </a:rPr>
               <a:t>Choose Hyper-parameter with Maximum Similarity</a:t>
             </a:r>
@@ -8120,13 +8336,13 @@
           <p:nvPr/>
         </p:nvCxnSpPr>
         <p:spPr>
-          <a:xfrm flipV="1">
-            <a:off x="5758489" y="2529916"/>
-            <a:ext cx="918772" cy="37206"/>
+          <a:xfrm>
+            <a:off x="5758489" y="2462937"/>
+            <a:ext cx="918772" cy="1663"/>
           </a:xfrm>
           <a:prstGeom prst="bentConnector3">
             <a:avLst>
-              <a:gd name="adj1" fmla="val 71611"/>
+              <a:gd name="adj1" fmla="val 50000"/>
             </a:avLst>
           </a:prstGeom>
           <a:ln w="38100" cap="flat" cmpd="sng" algn="ctr">
@@ -8188,6 +8404,8 @@
                 <a:solidFill>
                   <a:schemeClr val="tx2"/>
                 </a:solidFill>
+                <a:latin typeface="Times New Roman" panose="02020603050405020304" pitchFamily="18" charset="0"/>
+                <a:cs typeface="Times New Roman" panose="02020603050405020304" pitchFamily="18" charset="0"/>
               </a:rPr>
               <a:t>Models</a:t>
             </a:r>
@@ -8195,6 +8413,8 @@
               <a:solidFill>
                 <a:schemeClr val="tx2"/>
               </a:solidFill>
+              <a:latin typeface="Times New Roman" panose="02020603050405020304" pitchFamily="18" charset="0"/>
+              <a:cs typeface="Times New Roman" panose="02020603050405020304" pitchFamily="18" charset="0"/>
             </a:endParaRPr>
           </a:p>
         </p:txBody>
@@ -8233,6 +8453,8 @@
                 <a:solidFill>
                   <a:schemeClr val="tx2"/>
                 </a:solidFill>
+                <a:latin typeface="Times New Roman" panose="02020603050405020304" pitchFamily="18" charset="0"/>
+                <a:cs typeface="Times New Roman" panose="02020603050405020304" pitchFamily="18" charset="0"/>
               </a:rPr>
               <a:t>Labels</a:t>
             </a:r>
@@ -8240,6 +8462,8 @@
               <a:solidFill>
                 <a:schemeClr val="tx2"/>
               </a:solidFill>
+              <a:latin typeface="Times New Roman" panose="02020603050405020304" pitchFamily="18" charset="0"/>
+              <a:cs typeface="Times New Roman" panose="02020603050405020304" pitchFamily="18" charset="0"/>
             </a:endParaRPr>
           </a:p>
         </p:txBody>
@@ -8364,11 +8588,16 @@
                 <a:solidFill>
                   <a:schemeClr val="tx1"/>
                 </a:solidFill>
+                <a:latin typeface="Times New Roman" panose="02020603050405020304" pitchFamily="18" charset="0"/>
+                <a:cs typeface="Times New Roman" panose="02020603050405020304" pitchFamily="18" charset="0"/>
               </a:rPr>
               <a:t>P</a:t>
             </a:r>
             <a:r>
-              <a:rPr lang="en-US" sz="1200" baseline="-25000" dirty="0" err="1"/>
+              <a:rPr lang="en-US" sz="1200" baseline="-25000" dirty="0" err="1">
+                <a:latin typeface="Times New Roman" panose="02020603050405020304" pitchFamily="18" charset="0"/>
+                <a:cs typeface="Times New Roman" panose="02020603050405020304" pitchFamily="18" charset="0"/>
+              </a:rPr>
               <a:t>r</a:t>
             </a:r>
             <a:r>
@@ -8376,6 +8605,8 @@
                 <a:solidFill>
                   <a:schemeClr val="tx1"/>
                 </a:solidFill>
+                <a:latin typeface="Times New Roman" panose="02020603050405020304" pitchFamily="18" charset="0"/>
+                <a:cs typeface="Times New Roman" panose="02020603050405020304" pitchFamily="18" charset="0"/>
               </a:rPr>
               <a:t>:v</a:t>
             </a:r>
@@ -8384,6 +8615,8 @@
                 <a:solidFill>
                   <a:schemeClr val="tx1"/>
                 </a:solidFill>
+                <a:latin typeface="Times New Roman" panose="02020603050405020304" pitchFamily="18" charset="0"/>
+                <a:cs typeface="Times New Roman" panose="02020603050405020304" pitchFamily="18" charset="0"/>
               </a:rPr>
               <a:t>r_h</a:t>
             </a:r>
@@ -8391,6 +8624,8 @@
               <a:solidFill>
                 <a:schemeClr val="tx1"/>
               </a:solidFill>
+              <a:latin typeface="Times New Roman" panose="02020603050405020304" pitchFamily="18" charset="0"/>
+              <a:cs typeface="Times New Roman" panose="02020603050405020304" pitchFamily="18" charset="0"/>
             </a:endParaRPr>
           </a:p>
         </p:txBody>
@@ -8443,7 +8678,10 @@
           <a:lstStyle/>
           <a:p>
             <a:pPr algn="ctr"/>
-            <a:endParaRPr lang="en-US" sz="1200"/>
+            <a:endParaRPr lang="en-US" sz="1200">
+              <a:latin typeface="Times New Roman" panose="02020603050405020304" pitchFamily="18" charset="0"/>
+              <a:cs typeface="Times New Roman" panose="02020603050405020304" pitchFamily="18" charset="0"/>
+            </a:endParaRPr>
           </a:p>
         </p:txBody>
       </p:sp>
@@ -8495,7 +8733,10 @@
           <a:lstStyle/>
           <a:p>
             <a:pPr algn="ctr"/>
-            <a:endParaRPr lang="en-US" sz="1200"/>
+            <a:endParaRPr lang="en-US" sz="1200">
+              <a:latin typeface="Times New Roman" panose="02020603050405020304" pitchFamily="18" charset="0"/>
+              <a:cs typeface="Times New Roman" panose="02020603050405020304" pitchFamily="18" charset="0"/>
+            </a:endParaRPr>
           </a:p>
         </p:txBody>
       </p:sp>
@@ -8547,7 +8788,10 @@
           <a:lstStyle/>
           <a:p>
             <a:pPr algn="ctr"/>
-            <a:endParaRPr lang="en-US" sz="1200"/>
+            <a:endParaRPr lang="en-US" sz="1200">
+              <a:latin typeface="Times New Roman" panose="02020603050405020304" pitchFamily="18" charset="0"/>
+              <a:cs typeface="Times New Roman" panose="02020603050405020304" pitchFamily="18" charset="0"/>
+            </a:endParaRPr>
           </a:p>
         </p:txBody>
       </p:sp>
@@ -8570,11 +8814,11 @@
         <p:spPr>
           <a:xfrm>
             <a:off x="4783612" y="2574720"/>
-            <a:ext cx="232655" cy="118943"/>
+            <a:ext cx="232655" cy="1141"/>
           </a:xfrm>
           <a:prstGeom prst="bentConnector3">
             <a:avLst>
-              <a:gd name="adj1" fmla="val 14729"/>
+              <a:gd name="adj1" fmla="val 50000"/>
             </a:avLst>
           </a:prstGeom>
           <a:ln w="28575" cap="flat" cmpd="sng" algn="ctr">
@@ -8621,11 +8865,11 @@
         <p:spPr>
           <a:xfrm>
             <a:off x="4782597" y="1328695"/>
-            <a:ext cx="233670" cy="1364968"/>
+            <a:ext cx="233670" cy="1247166"/>
           </a:xfrm>
           <a:prstGeom prst="bentConnector3">
             <a:avLst>
-              <a:gd name="adj1" fmla="val 14882"/>
+              <a:gd name="adj1" fmla="val 26707"/>
             </a:avLst>
           </a:prstGeom>
           <a:ln w="19050" cap="flat" cmpd="sng" algn="ctr">
@@ -8667,8 +8911,8 @@
         </p:nvSpPr>
         <p:spPr>
           <a:xfrm>
-            <a:off x="5013798" y="2488052"/>
-            <a:ext cx="658749" cy="1460156"/>
+            <a:off x="5013798" y="2350924"/>
+            <a:ext cx="658749" cy="1597284"/>
           </a:xfrm>
           <a:prstGeom prst="rect">
             <a:avLst/>
@@ -8701,7 +8945,10 @@
           <a:lstStyle/>
           <a:p>
             <a:pPr algn="ctr"/>
-            <a:endParaRPr lang="en-US"/>
+            <a:endParaRPr lang="en-US">
+              <a:latin typeface="Times New Roman" panose="02020603050405020304" pitchFamily="18" charset="0"/>
+              <a:cs typeface="Times New Roman" panose="02020603050405020304" pitchFamily="18" charset="0"/>
+            </a:endParaRPr>
           </a:p>
         </p:txBody>
       </p:sp>
@@ -8770,8 +9017,8 @@
         </p:nvSpPr>
         <p:spPr>
           <a:xfrm>
-            <a:off x="5795380" y="2252298"/>
-            <a:ext cx="618065" cy="307777"/>
+            <a:off x="5795624" y="2154063"/>
+            <a:ext cx="640629" cy="276999"/>
           </a:xfrm>
           <a:prstGeom prst="rect">
             <a:avLst/>
@@ -8786,13 +9033,23 @@
           <a:p>
             <a:pPr algn="ctr"/>
             <a:r>
-              <a:rPr lang="en-US" sz="1400" dirty="0"/>
+              <a:rPr lang="en-US" sz="1200" dirty="0">
+                <a:latin typeface="Times New Roman" panose="02020603050405020304" pitchFamily="18" charset="0"/>
+                <a:cs typeface="Times New Roman" panose="02020603050405020304" pitchFamily="18" charset="0"/>
+              </a:rPr>
               <a:t>OI</a:t>
             </a:r>
             <a:r>
-              <a:rPr lang="en-US" sz="1400" baseline="-25000" dirty="0"/>
+              <a:rPr lang="en-US" sz="1200" baseline="-25000" dirty="0">
+                <a:latin typeface="Times New Roman" panose="02020603050405020304" pitchFamily="18" charset="0"/>
+                <a:cs typeface="Times New Roman" panose="02020603050405020304" pitchFamily="18" charset="0"/>
+              </a:rPr>
               <a:t>HAPV</a:t>
             </a:r>
+            <a:endParaRPr lang="en-US" sz="1400" baseline="-25000" dirty="0">
+              <a:latin typeface="Times New Roman" panose="02020603050405020304" pitchFamily="18" charset="0"/>
+              <a:cs typeface="Times New Roman" panose="02020603050405020304" pitchFamily="18" charset="0"/>
+            </a:endParaRPr>
           </a:p>
         </p:txBody>
       </p:sp>
@@ -8847,6 +9104,8 @@
               <a:solidFill>
                 <a:schemeClr val="tx1"/>
               </a:solidFill>
+              <a:latin typeface="Times New Roman" panose="02020603050405020304" pitchFamily="18" charset="0"/>
+              <a:cs typeface="Times New Roman" panose="02020603050405020304" pitchFamily="18" charset="0"/>
             </a:endParaRPr>
           </a:p>
         </p:txBody>
@@ -8885,6 +9144,8 @@
                 <a:solidFill>
                   <a:schemeClr val="tx2"/>
                 </a:solidFill>
+                <a:latin typeface="Times New Roman" panose="02020603050405020304" pitchFamily="18" charset="0"/>
+                <a:cs typeface="Times New Roman" panose="02020603050405020304" pitchFamily="18" charset="0"/>
               </a:rPr>
               <a:t>Run OI</a:t>
             </a:r>
@@ -8893,6 +9154,8 @@
                 <a:solidFill>
                   <a:schemeClr val="tx2"/>
                 </a:solidFill>
+                <a:latin typeface="Times New Roman" panose="02020603050405020304" pitchFamily="18" charset="0"/>
+                <a:cs typeface="Times New Roman" panose="02020603050405020304" pitchFamily="18" charset="0"/>
               </a:rPr>
               <a:t>HAPV</a:t>
             </a:r>
@@ -8901,6 +9164,8 @@
                 <a:solidFill>
                   <a:schemeClr val="tx2"/>
                 </a:solidFill>
+                <a:latin typeface="Times New Roman" panose="02020603050405020304" pitchFamily="18" charset="0"/>
+                <a:cs typeface="Times New Roman" panose="02020603050405020304" pitchFamily="18" charset="0"/>
               </a:rPr>
               <a:t> on Partitions</a:t>
             </a:r>
@@ -8908,6 +9173,8 @@
               <a:solidFill>
                 <a:schemeClr val="tx2"/>
               </a:solidFill>
+              <a:latin typeface="Times New Roman" panose="02020603050405020304" pitchFamily="18" charset="0"/>
+              <a:cs typeface="Times New Roman" panose="02020603050405020304" pitchFamily="18" charset="0"/>
             </a:endParaRPr>
           </a:p>
         </p:txBody>
@@ -8926,7 +9193,7 @@
         </p:nvSpPr>
         <p:spPr>
           <a:xfrm flipH="1">
-            <a:off x="6471284" y="2207805"/>
+            <a:off x="6471284" y="2142489"/>
             <a:ext cx="745596" cy="598150"/>
           </a:xfrm>
           <a:prstGeom prst="flowChartPunchedCard">
@@ -8963,6 +9230,8 @@
               <a:solidFill>
                 <a:schemeClr val="tx1"/>
               </a:solidFill>
+              <a:latin typeface="Times New Roman" panose="02020603050405020304" pitchFamily="18" charset="0"/>
+              <a:cs typeface="Times New Roman" panose="02020603050405020304" pitchFamily="18" charset="0"/>
             </a:endParaRPr>
           </a:p>
         </p:txBody>
@@ -9022,6 +9291,8 @@
               <a:solidFill>
                 <a:schemeClr val="bg1"/>
               </a:solidFill>
+              <a:latin typeface="Times New Roman" panose="02020603050405020304" pitchFamily="18" charset="0"/>
+              <a:cs typeface="Times New Roman" panose="02020603050405020304" pitchFamily="18" charset="0"/>
             </a:endParaRPr>
           </a:p>
         </p:txBody>
@@ -9082,6 +9353,8 @@
                 <a:solidFill>
                   <a:schemeClr val="bg1"/>
                 </a:solidFill>
+                <a:latin typeface="Times New Roman" panose="02020603050405020304" pitchFamily="18" charset="0"/>
+                <a:cs typeface="Times New Roman" panose="02020603050405020304" pitchFamily="18" charset="0"/>
               </a:rPr>
               <a:t>S</a:t>
             </a:r>
@@ -9090,6 +9363,8 @@
                 <a:solidFill>
                   <a:schemeClr val="bg1"/>
                 </a:solidFill>
+                <a:latin typeface="Times New Roman" panose="02020603050405020304" pitchFamily="18" charset="0"/>
+                <a:cs typeface="Times New Roman" panose="02020603050405020304" pitchFamily="18" charset="0"/>
               </a:rPr>
               <a:t>i</a:t>
             </a:r>
@@ -9144,7 +9419,10 @@
           <a:lstStyle/>
           <a:p>
             <a:pPr algn="ctr"/>
-            <a:endParaRPr lang="en-US"/>
+            <a:endParaRPr lang="en-US">
+              <a:latin typeface="Times New Roman" panose="02020603050405020304" pitchFamily="18" charset="0"/>
+              <a:cs typeface="Times New Roman" panose="02020603050405020304" pitchFamily="18" charset="0"/>
+            </a:endParaRPr>
           </a:p>
         </p:txBody>
       </p:sp>
@@ -9196,7 +9474,10 @@
           <a:lstStyle/>
           <a:p>
             <a:pPr algn="ctr"/>
-            <a:endParaRPr lang="en-US"/>
+            <a:endParaRPr lang="en-US">
+              <a:latin typeface="Times New Roman" panose="02020603050405020304" pitchFamily="18" charset="0"/>
+              <a:cs typeface="Times New Roman" panose="02020603050405020304" pitchFamily="18" charset="0"/>
+            </a:endParaRPr>
           </a:p>
         </p:txBody>
       </p:sp>
@@ -9248,7 +9529,10 @@
           <a:lstStyle/>
           <a:p>
             <a:pPr algn="ctr"/>
-            <a:endParaRPr lang="en-US"/>
+            <a:endParaRPr lang="en-US">
+              <a:latin typeface="Times New Roman" panose="02020603050405020304" pitchFamily="18" charset="0"/>
+              <a:cs typeface="Times New Roman" panose="02020603050405020304" pitchFamily="18" charset="0"/>
+            </a:endParaRPr>
           </a:p>
         </p:txBody>
       </p:sp>
@@ -9351,7 +9635,10 @@
           <a:lstStyle/>
           <a:p>
             <a:pPr algn="ctr"/>
-            <a:endParaRPr lang="en-US"/>
+            <a:endParaRPr lang="en-US">
+              <a:latin typeface="Times New Roman" panose="02020603050405020304" pitchFamily="18" charset="0"/>
+              <a:cs typeface="Times New Roman" panose="02020603050405020304" pitchFamily="18" charset="0"/>
+            </a:endParaRPr>
           </a:p>
         </p:txBody>
       </p:sp>
@@ -9403,7 +9690,10 @@
           <a:lstStyle/>
           <a:p>
             <a:pPr algn="ctr"/>
-            <a:endParaRPr lang="en-US"/>
+            <a:endParaRPr lang="en-US">
+              <a:latin typeface="Times New Roman" panose="02020603050405020304" pitchFamily="18" charset="0"/>
+              <a:cs typeface="Times New Roman" panose="02020603050405020304" pitchFamily="18" charset="0"/>
+            </a:endParaRPr>
           </a:p>
         </p:txBody>
       </p:sp>
@@ -9455,7 +9745,10 @@
           <a:lstStyle/>
           <a:p>
             <a:pPr algn="ctr"/>
-            <a:endParaRPr lang="en-US"/>
+            <a:endParaRPr lang="en-US">
+              <a:latin typeface="Times New Roman" panose="02020603050405020304" pitchFamily="18" charset="0"/>
+              <a:cs typeface="Times New Roman" panose="02020603050405020304" pitchFamily="18" charset="0"/>
+            </a:endParaRPr>
           </a:p>
         </p:txBody>
       </p:sp>
@@ -9507,7 +9800,10 @@
           <a:lstStyle/>
           <a:p>
             <a:pPr algn="ctr"/>
-            <a:endParaRPr lang="en-US"/>
+            <a:endParaRPr lang="en-US">
+              <a:latin typeface="Times New Roman" panose="02020603050405020304" pitchFamily="18" charset="0"/>
+              <a:cs typeface="Times New Roman" panose="02020603050405020304" pitchFamily="18" charset="0"/>
+            </a:endParaRPr>
           </a:p>
         </p:txBody>
       </p:sp>
@@ -9559,7 +9855,10 @@
           <a:lstStyle/>
           <a:p>
             <a:pPr algn="ctr"/>
-            <a:endParaRPr lang="en-US"/>
+            <a:endParaRPr lang="en-US">
+              <a:latin typeface="Times New Roman" panose="02020603050405020304" pitchFamily="18" charset="0"/>
+              <a:cs typeface="Times New Roman" panose="02020603050405020304" pitchFamily="18" charset="0"/>
+            </a:endParaRPr>
           </a:p>
         </p:txBody>
       </p:sp>
@@ -9611,7 +9910,10 @@
           <a:lstStyle/>
           <a:p>
             <a:pPr algn="ctr"/>
-            <a:endParaRPr lang="en-US"/>
+            <a:endParaRPr lang="en-US">
+              <a:latin typeface="Times New Roman" panose="02020603050405020304" pitchFamily="18" charset="0"/>
+              <a:cs typeface="Times New Roman" panose="02020603050405020304" pitchFamily="18" charset="0"/>
+            </a:endParaRPr>
           </a:p>
         </p:txBody>
       </p:sp>
@@ -9656,7 +9958,10 @@
           <a:lstStyle/>
           <a:p>
             <a:pPr algn="ctr"/>
-            <a:endParaRPr lang="en-US" sz="1200" dirty="0"/>
+            <a:endParaRPr lang="en-US" sz="1200" dirty="0">
+              <a:latin typeface="Times New Roman" panose="02020603050405020304" pitchFamily="18" charset="0"/>
+              <a:cs typeface="Times New Roman" panose="02020603050405020304" pitchFamily="18" charset="0"/>
+            </a:endParaRPr>
           </a:p>
         </p:txBody>
       </p:sp>
@@ -9675,7 +9980,7 @@
         <p:spPr>
           <a:xfrm>
             <a:off x="3571734" y="2415081"/>
-            <a:ext cx="1089891" cy="307777"/>
+            <a:ext cx="1089891" cy="276999"/>
           </a:xfrm>
           <a:prstGeom prst="rect">
             <a:avLst/>
@@ -9690,11 +9995,17 @@
           <a:p>
             <a:pPr algn="ctr"/>
             <a:r>
-              <a:rPr lang="en-US" sz="1400" b="1" dirty="0"/>
+              <a:rPr lang="en-US" sz="1200" b="1" dirty="0">
+                <a:latin typeface="Times New Roman" panose="02020603050405020304" pitchFamily="18" charset="0"/>
+                <a:cs typeface="Times New Roman" panose="02020603050405020304" pitchFamily="18" charset="0"/>
+              </a:rPr>
               <a:t>Similarity</a:t>
             </a:r>
             <a:r>
-              <a:rPr lang="en-US" sz="1400" b="1" baseline="-25000" dirty="0"/>
+              <a:rPr lang="en-US" sz="1200" b="1" baseline="-25000" dirty="0">
+                <a:latin typeface="Times New Roman" panose="02020603050405020304" pitchFamily="18" charset="0"/>
+                <a:cs typeface="Times New Roman" panose="02020603050405020304" pitchFamily="18" charset="0"/>
+              </a:rPr>
               <a:t>1_2</a:t>
             </a:r>
           </a:p>
@@ -9741,7 +10052,10 @@
           <a:lstStyle/>
           <a:p>
             <a:pPr algn="ctr"/>
-            <a:endParaRPr lang="en-US" sz="1200" dirty="0"/>
+            <a:endParaRPr lang="en-US" sz="1200" dirty="0">
+              <a:latin typeface="Times New Roman" panose="02020603050405020304" pitchFamily="18" charset="0"/>
+              <a:cs typeface="Times New Roman" panose="02020603050405020304" pitchFamily="18" charset="0"/>
+            </a:endParaRPr>
           </a:p>
         </p:txBody>
       </p:sp>
@@ -9760,7 +10074,7 @@
         <p:spPr>
           <a:xfrm>
             <a:off x="3574223" y="3622998"/>
-            <a:ext cx="1087402" cy="307777"/>
+            <a:ext cx="1087402" cy="276999"/>
           </a:xfrm>
           <a:prstGeom prst="rect">
             <a:avLst/>
@@ -9775,14 +10089,23 @@
           <a:p>
             <a:pPr algn="ctr"/>
             <a:r>
-              <a:rPr lang="en-US" sz="1400" b="1" dirty="0" err="1"/>
+              <a:rPr lang="en-US" sz="1200" b="1" dirty="0" err="1">
+                <a:latin typeface="Times New Roman" panose="02020603050405020304" pitchFamily="18" charset="0"/>
+                <a:cs typeface="Times New Roman" panose="02020603050405020304" pitchFamily="18" charset="0"/>
+              </a:rPr>
               <a:t>Similarity</a:t>
             </a:r>
             <a:r>
-              <a:rPr lang="en-US" sz="1400" b="1" baseline="-25000" dirty="0" err="1"/>
+              <a:rPr lang="en-US" sz="1200" b="1" baseline="-25000" dirty="0" err="1">
+                <a:latin typeface="Times New Roman" panose="02020603050405020304" pitchFamily="18" charset="0"/>
+                <a:cs typeface="Times New Roman" panose="02020603050405020304" pitchFamily="18" charset="0"/>
+              </a:rPr>
               <a:t>r_h</a:t>
             </a:r>
-            <a:endParaRPr lang="en-US" sz="1400" b="1" baseline="-25000" dirty="0"/>
+            <a:endParaRPr lang="en-US" sz="1200" b="1" baseline="-25000" dirty="0">
+              <a:latin typeface="Times New Roman" panose="02020603050405020304" pitchFamily="18" charset="0"/>
+              <a:cs typeface="Times New Roman" panose="02020603050405020304" pitchFamily="18" charset="0"/>
+            </a:endParaRPr>
           </a:p>
         </p:txBody>
       </p:sp>
@@ -9801,7 +10124,7 @@
         <p:spPr>
           <a:xfrm>
             <a:off x="6349563" y="412508"/>
-            <a:ext cx="1333295" cy="738664"/>
+            <a:ext cx="1333295" cy="692497"/>
           </a:xfrm>
           <a:prstGeom prst="rect">
             <a:avLst/>
@@ -9816,14 +10139,23 @@
           <a:p>
             <a:pPr algn="ctr"/>
             <a:r>
-              <a:rPr lang="en-US" sz="1400" b="1" dirty="0"/>
+              <a:rPr lang="en-US" sz="1300" b="1" dirty="0">
+                <a:latin typeface="Times New Roman" panose="02020603050405020304" pitchFamily="18" charset="0"/>
+                <a:cs typeface="Times New Roman" panose="02020603050405020304" pitchFamily="18" charset="0"/>
+              </a:rPr>
               <a:t>Generate Models Using OI</a:t>
             </a:r>
             <a:r>
-              <a:rPr lang="en-US" sz="1400" b="1" baseline="-25000" dirty="0"/>
+              <a:rPr lang="en-US" sz="1300" b="1" baseline="-25000" dirty="0">
+                <a:latin typeface="Times New Roman" panose="02020603050405020304" pitchFamily="18" charset="0"/>
+                <a:cs typeface="Times New Roman" panose="02020603050405020304" pitchFamily="18" charset="0"/>
+              </a:rPr>
               <a:t>HAPV</a:t>
             </a:r>
-            <a:endParaRPr lang="en-US" sz="1400" b="1" dirty="0"/>
+            <a:endParaRPr lang="en-US" sz="1300" b="1" dirty="0">
+              <a:latin typeface="Times New Roman" panose="02020603050405020304" pitchFamily="18" charset="0"/>
+              <a:cs typeface="Times New Roman" panose="02020603050405020304" pitchFamily="18" charset="0"/>
+            </a:endParaRPr>
           </a:p>
         </p:txBody>
       </p:sp>
@@ -9856,23 +10188,38 @@
           <a:lstStyle/>
           <a:p>
             <a:r>
-              <a:rPr lang="en-US" sz="1200" b="1" i="1" dirty="0" err="1"/>
+              <a:rPr lang="en-US" sz="1200" b="1" i="1" dirty="0" err="1">
+                <a:latin typeface="Times New Roman" panose="02020603050405020304" pitchFamily="18" charset="0"/>
+                <a:cs typeface="Times New Roman" panose="02020603050405020304" pitchFamily="18" charset="0"/>
+              </a:rPr>
               <a:t>i</a:t>
             </a:r>
             <a:r>
-              <a:rPr lang="en-US" sz="1200" i="1" dirty="0"/>
+              <a:rPr lang="en-US" sz="1200" i="1" dirty="0">
+                <a:latin typeface="Times New Roman" panose="02020603050405020304" pitchFamily="18" charset="0"/>
+                <a:cs typeface="Times New Roman" panose="02020603050405020304" pitchFamily="18" charset="0"/>
+              </a:rPr>
               <a:t> </a:t>
             </a:r>
             <a:r>
-              <a:rPr lang="en-US" sz="1200" dirty="0"/>
+              <a:rPr lang="en-US" sz="1200" dirty="0">
+                <a:latin typeface="Times New Roman" panose="02020603050405020304" pitchFamily="18" charset="0"/>
+                <a:cs typeface="Times New Roman" panose="02020603050405020304" pitchFamily="18" charset="0"/>
+              </a:rPr>
               <a:t>= Number of possible values across </a:t>
             </a:r>
             <a:r>
-              <a:rPr lang="en-US" sz="1200" b="1" i="1" dirty="0"/>
+              <a:rPr lang="en-US" sz="1200" b="1" i="1" dirty="0">
+                <a:latin typeface="Times New Roman" panose="02020603050405020304" pitchFamily="18" charset="0"/>
+                <a:cs typeface="Times New Roman" panose="02020603050405020304" pitchFamily="18" charset="0"/>
+              </a:rPr>
               <a:t>r</a:t>
             </a:r>
             <a:r>
-              <a:rPr lang="en-US" sz="1200" dirty="0"/>
+              <a:rPr lang="en-US" sz="1200" dirty="0">
+                <a:latin typeface="Times New Roman" panose="02020603050405020304" pitchFamily="18" charset="0"/>
+                <a:cs typeface="Times New Roman" panose="02020603050405020304" pitchFamily="18" charset="0"/>
+              </a:rPr>
               <a:t> hyper-parameters  </a:t>
             </a:r>
           </a:p>
@@ -9926,7 +10273,10 @@
           <a:lstStyle/>
           <a:p>
             <a:pPr algn="ctr"/>
-            <a:endParaRPr lang="en-US" sz="1200"/>
+            <a:endParaRPr lang="en-US" sz="1200">
+              <a:latin typeface="Times New Roman" panose="02020603050405020304" pitchFamily="18" charset="0"/>
+              <a:cs typeface="Times New Roman" panose="02020603050405020304" pitchFamily="18" charset="0"/>
+            </a:endParaRPr>
           </a:p>
         </p:txBody>
       </p:sp>
@@ -9978,7 +10328,10 @@
           <a:lstStyle/>
           <a:p>
             <a:pPr algn="ctr"/>
-            <a:endParaRPr lang="en-US" sz="1200"/>
+            <a:endParaRPr lang="en-US" sz="1200">
+              <a:latin typeface="Times New Roman" panose="02020603050405020304" pitchFamily="18" charset="0"/>
+              <a:cs typeface="Times New Roman" panose="02020603050405020304" pitchFamily="18" charset="0"/>
+            </a:endParaRPr>
           </a:p>
         </p:txBody>
       </p:sp>
@@ -10030,7 +10383,10 @@
           <a:lstStyle/>
           <a:p>
             <a:pPr algn="ctr"/>
-            <a:endParaRPr lang="en-US" sz="1200"/>
+            <a:endParaRPr lang="en-US" sz="1200">
+              <a:latin typeface="Times New Roman" panose="02020603050405020304" pitchFamily="18" charset="0"/>
+              <a:cs typeface="Times New Roman" panose="02020603050405020304" pitchFamily="18" charset="0"/>
+            </a:endParaRPr>
           </a:p>
         </p:txBody>
       </p:sp>
@@ -10082,7 +10438,10 @@
           <a:lstStyle/>
           <a:p>
             <a:pPr algn="ctr"/>
-            <a:endParaRPr lang="en-US" sz="1200"/>
+            <a:endParaRPr lang="en-US" sz="1200">
+              <a:latin typeface="Times New Roman" panose="02020603050405020304" pitchFamily="18" charset="0"/>
+              <a:cs typeface="Times New Roman" panose="02020603050405020304" pitchFamily="18" charset="0"/>
+            </a:endParaRPr>
           </a:p>
         </p:txBody>
       </p:sp>
@@ -10134,7 +10493,10 @@
           <a:lstStyle/>
           <a:p>
             <a:pPr algn="ctr"/>
-            <a:endParaRPr lang="en-US" sz="1200"/>
+            <a:endParaRPr lang="en-US" sz="1200">
+              <a:latin typeface="Times New Roman" panose="02020603050405020304" pitchFamily="18" charset="0"/>
+              <a:cs typeface="Times New Roman" panose="02020603050405020304" pitchFamily="18" charset="0"/>
+            </a:endParaRPr>
           </a:p>
         </p:txBody>
       </p:sp>
@@ -10186,7 +10548,10 @@
           <a:lstStyle/>
           <a:p>
             <a:pPr algn="ctr"/>
-            <a:endParaRPr lang="en-US" sz="1200"/>
+            <a:endParaRPr lang="en-US" sz="1200">
+              <a:latin typeface="Times New Roman" panose="02020603050405020304" pitchFamily="18" charset="0"/>
+              <a:cs typeface="Times New Roman" panose="02020603050405020304" pitchFamily="18" charset="0"/>
+            </a:endParaRPr>
           </a:p>
         </p:txBody>
       </p:sp>
@@ -10238,7 +10603,10 @@
           <a:lstStyle/>
           <a:p>
             <a:pPr algn="ctr"/>
-            <a:endParaRPr lang="en-US" sz="1200"/>
+            <a:endParaRPr lang="en-US" sz="1200">
+              <a:latin typeface="Times New Roman" panose="02020603050405020304" pitchFamily="18" charset="0"/>
+              <a:cs typeface="Times New Roman" panose="02020603050405020304" pitchFamily="18" charset="0"/>
+            </a:endParaRPr>
           </a:p>
         </p:txBody>
       </p:sp>
@@ -10290,7 +10658,10 @@
           <a:lstStyle/>
           <a:p>
             <a:pPr algn="ctr"/>
-            <a:endParaRPr lang="en-US" sz="1200"/>
+            <a:endParaRPr lang="en-US" sz="1200">
+              <a:latin typeface="Times New Roman" panose="02020603050405020304" pitchFamily="18" charset="0"/>
+              <a:cs typeface="Times New Roman" panose="02020603050405020304" pitchFamily="18" charset="0"/>
+            </a:endParaRPr>
           </a:p>
         </p:txBody>
       </p:sp>
@@ -10342,7 +10713,10 @@
           <a:lstStyle/>
           <a:p>
             <a:pPr algn="ctr"/>
-            <a:endParaRPr lang="en-US" sz="1200"/>
+            <a:endParaRPr lang="en-US" sz="1200">
+              <a:latin typeface="Times New Roman" panose="02020603050405020304" pitchFamily="18" charset="0"/>
+              <a:cs typeface="Times New Roman" panose="02020603050405020304" pitchFamily="18" charset="0"/>
+            </a:endParaRPr>
           </a:p>
         </p:txBody>
       </p:sp>
@@ -10394,7 +10768,10 @@
           <a:lstStyle/>
           <a:p>
             <a:pPr algn="ctr"/>
-            <a:endParaRPr lang="en-US" sz="1200"/>
+            <a:endParaRPr lang="en-US" sz="1200">
+              <a:latin typeface="Times New Roman" panose="02020603050405020304" pitchFamily="18" charset="0"/>
+              <a:cs typeface="Times New Roman" panose="02020603050405020304" pitchFamily="18" charset="0"/>
+            </a:endParaRPr>
           </a:p>
         </p:txBody>
       </p:sp>
@@ -10446,7 +10823,10 @@
           <a:lstStyle/>
           <a:p>
             <a:pPr algn="ctr"/>
-            <a:endParaRPr lang="en-US" sz="1200"/>
+            <a:endParaRPr lang="en-US" sz="1200">
+              <a:latin typeface="Times New Roman" panose="02020603050405020304" pitchFamily="18" charset="0"/>
+              <a:cs typeface="Times New Roman" panose="02020603050405020304" pitchFamily="18" charset="0"/>
+            </a:endParaRPr>
           </a:p>
         </p:txBody>
       </p:sp>
@@ -10498,7 +10878,10 @@
           <a:lstStyle/>
           <a:p>
             <a:pPr algn="ctr"/>
-            <a:endParaRPr lang="en-US" sz="1200"/>
+            <a:endParaRPr lang="en-US" sz="1200">
+              <a:latin typeface="Times New Roman" panose="02020603050405020304" pitchFamily="18" charset="0"/>
+              <a:cs typeface="Times New Roman" panose="02020603050405020304" pitchFamily="18" charset="0"/>
+            </a:endParaRPr>
           </a:p>
         </p:txBody>
       </p:sp>
@@ -10521,11 +10904,11 @@
         <p:spPr>
           <a:xfrm flipV="1">
             <a:off x="5758489" y="1459376"/>
-            <a:ext cx="913195" cy="1107746"/>
+            <a:ext cx="913195" cy="1003561"/>
           </a:xfrm>
           <a:prstGeom prst="bentConnector3">
             <a:avLst>
-              <a:gd name="adj1" fmla="val 71743"/>
+              <a:gd name="adj1" fmla="val 71457"/>
             </a:avLst>
           </a:prstGeom>
           <a:ln w="38100" cap="flat" cmpd="sng" algn="ctr">
@@ -10568,9 +10951,9 @@
           <p:nvPr/>
         </p:nvCxnSpPr>
         <p:spPr>
-          <a:xfrm>
-            <a:off x="7016210" y="232658"/>
-            <a:ext cx="0" cy="182582"/>
+          <a:xfrm flipH="1">
+            <a:off x="7016210" y="108857"/>
+            <a:ext cx="8277" cy="306383"/>
           </a:xfrm>
           <a:prstGeom prst="straightConnector1">
             <a:avLst/>
@@ -10644,45 +11027,66 @@
           <a:p>
             <a:pPr algn="ctr"/>
             <a:r>
-              <a:rPr lang="en-US" sz="1600" dirty="0"/>
+              <a:rPr lang="en-US" sz="1400" dirty="0">
+                <a:latin typeface="Times New Roman" panose="02020603050405020304" pitchFamily="18" charset="0"/>
+                <a:cs typeface="Times New Roman" panose="02020603050405020304" pitchFamily="18" charset="0"/>
+              </a:rPr>
               <a:t>[…,</a:t>
             </a:r>
             <a:r>
-              <a:rPr lang="en-US" sz="1600" i="1" dirty="0">
-                <a:latin typeface="APPLE CHANCERY" panose="03020702040506060504" pitchFamily="66" charset="-79"/>
-                <a:cs typeface="APPLE CHANCERY" panose="03020702040506060504" pitchFamily="66" charset="-79"/>
+              <a:rPr lang="en-US" sz="1400" i="1" dirty="0">
+                <a:latin typeface="Times New Roman" panose="02020603050405020304" pitchFamily="18" charset="0"/>
+                <a:cs typeface="Times New Roman" panose="02020603050405020304" pitchFamily="18" charset="0"/>
               </a:rPr>
               <a:t>l</a:t>
             </a:r>
             <a:r>
-              <a:rPr lang="en-US" sz="1600" dirty="0"/>
+              <a:rPr lang="en-US" sz="1400" dirty="0">
+                <a:latin typeface="Times New Roman" panose="02020603050405020304" pitchFamily="18" charset="0"/>
+                <a:cs typeface="Times New Roman" panose="02020603050405020304" pitchFamily="18" charset="0"/>
+              </a:rPr>
               <a:t> </a:t>
             </a:r>
             <a:r>
-              <a:rPr lang="en-US" sz="1600" baseline="-25000" dirty="0" err="1"/>
+              <a:rPr lang="en-US" sz="1400" baseline="-25000" dirty="0" err="1">
+                <a:latin typeface="Times New Roman" panose="02020603050405020304" pitchFamily="18" charset="0"/>
+                <a:cs typeface="Times New Roman" panose="02020603050405020304" pitchFamily="18" charset="0"/>
+              </a:rPr>
               <a:t>Sn_Mm</a:t>
             </a:r>
             <a:r>
-              <a:rPr lang="en-US" sz="1600" dirty="0" err="1"/>
+              <a:rPr lang="en-US" sz="1400" dirty="0" err="1">
+                <a:latin typeface="Times New Roman" panose="02020603050405020304" pitchFamily="18" charset="0"/>
+                <a:cs typeface="Times New Roman" panose="02020603050405020304" pitchFamily="18" charset="0"/>
+              </a:rPr>
               <a:t>,</a:t>
             </a:r>
             <a:r>
-              <a:rPr lang="en-US" sz="1600" i="1" dirty="0" err="1">
-                <a:latin typeface="APPLE CHANCERY" panose="03020702040506060504" pitchFamily="66" charset="-79"/>
-                <a:cs typeface="APPLE CHANCERY" panose="03020702040506060504" pitchFamily="66" charset="-79"/>
+              <a:rPr lang="en-US" sz="1400" i="1" dirty="0" err="1">
+                <a:latin typeface="Times New Roman" panose="02020603050405020304" pitchFamily="18" charset="0"/>
+                <a:cs typeface="Times New Roman" panose="02020603050405020304" pitchFamily="18" charset="0"/>
               </a:rPr>
               <a:t>l</a:t>
             </a:r>
             <a:r>
-              <a:rPr lang="en-US" sz="1600" dirty="0"/>
+              <a:rPr lang="en-US" sz="1400" dirty="0">
+                <a:latin typeface="Times New Roman" panose="02020603050405020304" pitchFamily="18" charset="0"/>
+                <a:cs typeface="Times New Roman" panose="02020603050405020304" pitchFamily="18" charset="0"/>
+              </a:rPr>
               <a:t> </a:t>
             </a:r>
             <a:r>
-              <a:rPr lang="en-US" sz="1600" baseline="-25000" dirty="0" err="1"/>
+              <a:rPr lang="en-US" sz="1400" baseline="-25000" dirty="0" err="1">
+                <a:latin typeface="Times New Roman" panose="02020603050405020304" pitchFamily="18" charset="0"/>
+                <a:cs typeface="Times New Roman" panose="02020603050405020304" pitchFamily="18" charset="0"/>
+              </a:rPr>
               <a:t>Sn_Mn</a:t>
             </a:r>
             <a:r>
-              <a:rPr lang="en-US" sz="1600" dirty="0"/>
+              <a:rPr lang="en-US" sz="1400" dirty="0">
+                <a:latin typeface="Times New Roman" panose="02020603050405020304" pitchFamily="18" charset="0"/>
+                <a:cs typeface="Times New Roman" panose="02020603050405020304" pitchFamily="18" charset="0"/>
+              </a:rPr>
               <a:t>]</a:t>
             </a:r>
           </a:p>
@@ -10782,19 +11186,18 @@
             <a:pPr algn="ctr"/>
             <a:r>
               <a:rPr lang="en-US" sz="1600" i="1" dirty="0">
-                <a:latin typeface="APPLE CHANCERY" panose="03020702040506060504" pitchFamily="66" charset="-79"/>
-                <a:cs typeface="APPLE CHANCERY" panose="03020702040506060504" pitchFamily="66" charset="-79"/>
+                <a:latin typeface="Times New Roman" panose="02020603050405020304" pitchFamily="18" charset="0"/>
+                <a:cs typeface="Times New Roman" panose="02020603050405020304" pitchFamily="18" charset="0"/>
               </a:rPr>
               <a:t>l</a:t>
             </a:r>
             <a:r>
               <a:rPr lang="en-US" sz="1600" i="1" baseline="-25000" dirty="0">
-                <a:latin typeface="APPLE CHANCERY" panose="03020702040506060504" pitchFamily="66" charset="-79"/>
-                <a:cs typeface="APPLE CHANCERY" panose="03020702040506060504" pitchFamily="66" charset="-79"/>
+                <a:latin typeface="Times New Roman" panose="02020603050405020304" pitchFamily="18" charset="0"/>
+                <a:cs typeface="Times New Roman" panose="02020603050405020304" pitchFamily="18" charset="0"/>
               </a:rPr>
               <a:t>n</a:t>
             </a:r>
-            <a:endParaRPr lang="en-US" sz="1600" i="1" baseline="-25000" dirty="0"/>
           </a:p>
         </p:txBody>
       </p:sp>
@@ -10902,6 +11305,8 @@
                 <a:solidFill>
                   <a:schemeClr val="bg1"/>
                 </a:solidFill>
+                <a:latin typeface="Times New Roman" panose="02020603050405020304" pitchFamily="18" charset="0"/>
+                <a:cs typeface="Times New Roman" panose="02020603050405020304" pitchFamily="18" charset="0"/>
               </a:rPr>
               <a:t>S</a:t>
             </a:r>
@@ -10910,6 +11315,8 @@
                 <a:solidFill>
                   <a:schemeClr val="bg1"/>
                 </a:solidFill>
+                <a:latin typeface="Times New Roman" panose="02020603050405020304" pitchFamily="18" charset="0"/>
+                <a:cs typeface="Times New Roman" panose="02020603050405020304" pitchFamily="18" charset="0"/>
               </a:rPr>
               <a:t>n</a:t>
             </a:r>
@@ -10959,11 +11366,17 @@
           <a:p>
             <a:pPr algn="ctr"/>
             <a:r>
-              <a:rPr lang="en-US" sz="1400" dirty="0"/>
+              <a:rPr lang="en-US" sz="1400" dirty="0">
+                <a:latin typeface="Times New Roman" panose="02020603050405020304" pitchFamily="18" charset="0"/>
+                <a:cs typeface="Times New Roman" panose="02020603050405020304" pitchFamily="18" charset="0"/>
+              </a:rPr>
               <a:t>M</a:t>
             </a:r>
             <a:r>
-              <a:rPr lang="en-US" sz="1400" baseline="-25000" dirty="0"/>
+              <a:rPr lang="en-US" sz="1400" baseline="-25000" dirty="0">
+                <a:latin typeface="Times New Roman" panose="02020603050405020304" pitchFamily="18" charset="0"/>
+                <a:cs typeface="Times New Roman" panose="02020603050405020304" pitchFamily="18" charset="0"/>
+              </a:rPr>
               <a:t>n</a:t>
             </a:r>
           </a:p>
@@ -11023,6 +11436,8 @@
                 <a:solidFill>
                   <a:schemeClr val="bg1"/>
                 </a:solidFill>
+                <a:latin typeface="Times New Roman" panose="02020603050405020304" pitchFamily="18" charset="0"/>
+                <a:cs typeface="Times New Roman" panose="02020603050405020304" pitchFamily="18" charset="0"/>
               </a:rPr>
               <a:t>S</a:t>
             </a:r>
@@ -11031,6 +11446,8 @@
                 <a:solidFill>
                   <a:schemeClr val="bg1"/>
                 </a:solidFill>
+                <a:latin typeface="Times New Roman" panose="02020603050405020304" pitchFamily="18" charset="0"/>
+                <a:cs typeface="Times New Roman" panose="02020603050405020304" pitchFamily="18" charset="0"/>
               </a:rPr>
               <a:t>n</a:t>
             </a:r>
@@ -11188,6 +11605,8 @@
               <a:solidFill>
                 <a:schemeClr val="tx1"/>
               </a:solidFill>
+              <a:latin typeface="Times New Roman" panose="02020603050405020304" pitchFamily="18" charset="0"/>
+              <a:cs typeface="Times New Roman" panose="02020603050405020304" pitchFamily="18" charset="0"/>
             </a:endParaRPr>
           </a:p>
         </p:txBody>
@@ -11259,12 +11678,12 @@
         </p:nvCxnSpPr>
         <p:spPr>
           <a:xfrm>
-            <a:off x="5758489" y="2567122"/>
-            <a:ext cx="916040" cy="1725310"/>
+            <a:off x="5758489" y="2462937"/>
+            <a:ext cx="916040" cy="1829495"/>
           </a:xfrm>
           <a:prstGeom prst="bentConnector3">
             <a:avLst>
-              <a:gd name="adj1" fmla="val 71675"/>
+              <a:gd name="adj1" fmla="val 71390"/>
             </a:avLst>
           </a:prstGeom>
           <a:ln w="38100" cap="flat" cmpd="sng" algn="ctr">

</xml_diff>